<commit_message>
Finish up unit tests
</commit_message>
<xml_diff>
--- a/C#/MediaExchangerAlgorithm/Plate Testing.pptx
+++ b/C#/MediaExchangerAlgorithm/Plate Testing.pptx
@@ -10,6 +10,7 @@
     <p:sldId id="259" r:id="rId4"/>
     <p:sldId id="260" r:id="rId5"/>
     <p:sldId id="261" r:id="rId6"/>
+    <p:sldId id="262" r:id="rId7"/>
   </p:sldIdLst>
   <p:sldSz cx="12192000" cy="6858000"/>
   <p:notesSz cx="6858000" cy="9144000"/>
@@ -3365,7 +3366,7 @@
         </p:nvCxnSpPr>
         <p:spPr>
           <a:xfrm>
-            <a:off x="5028546" y="2821874"/>
+            <a:off x="8267859" y="2821874"/>
             <a:ext cx="3240000" cy="0"/>
           </a:xfrm>
           <a:prstGeom prst="line">
@@ -3528,7 +3529,7 @@
         </p:nvCxnSpPr>
         <p:spPr>
           <a:xfrm>
-            <a:off x="5028546" y="2975268"/>
+            <a:off x="8267859" y="2975268"/>
             <a:ext cx="0" cy="900000"/>
           </a:xfrm>
           <a:prstGeom prst="straightConnector1">
@@ -3567,7 +3568,7 @@
         </p:nvSpPr>
         <p:spPr>
           <a:xfrm>
-            <a:off x="4753470" y="2299149"/>
+            <a:off x="7992783" y="2299149"/>
             <a:ext cx="550151" cy="369332"/>
           </a:xfrm>
           <a:prstGeom prst="rect">
@@ -3637,7 +3638,7 @@
         </p:nvSpPr>
         <p:spPr>
           <a:xfrm>
-            <a:off x="7998546" y="2299149"/>
+            <a:off x="11237859" y="2299149"/>
             <a:ext cx="556563" cy="369332"/>
           </a:xfrm>
           <a:prstGeom prst="rect">
@@ -3795,7 +3796,7 @@
         </p:nvCxnSpPr>
         <p:spPr>
           <a:xfrm flipH="1">
-            <a:off x="8268546" y="2975268"/>
+            <a:off x="11507859" y="2975268"/>
             <a:ext cx="0" cy="900000"/>
           </a:xfrm>
           <a:prstGeom prst="straightConnector1">
@@ -5624,7 +5625,7 @@
         </p:nvCxnSpPr>
         <p:spPr>
           <a:xfrm>
-            <a:off x="4020546" y="4994484"/>
+            <a:off x="4295622" y="4994484"/>
             <a:ext cx="3240000" cy="0"/>
           </a:xfrm>
           <a:prstGeom prst="line">
@@ -5667,7 +5668,7 @@
         </p:nvCxnSpPr>
         <p:spPr>
           <a:xfrm>
-            <a:off x="4020546" y="5147878"/>
+            <a:off x="4295622" y="5147878"/>
             <a:ext cx="0" cy="900000"/>
           </a:xfrm>
           <a:prstGeom prst="straightConnector1">
@@ -5706,7 +5707,7 @@
         </p:nvSpPr>
         <p:spPr>
           <a:xfrm>
-            <a:off x="3745470" y="4471759"/>
+            <a:off x="4020546" y="4471759"/>
             <a:ext cx="550151" cy="369332"/>
           </a:xfrm>
           <a:prstGeom prst="rect">
@@ -5741,7 +5742,7 @@
         </p:nvSpPr>
         <p:spPr>
           <a:xfrm>
-            <a:off x="6990546" y="4471759"/>
+            <a:off x="7265622" y="4471759"/>
             <a:ext cx="556563" cy="369332"/>
           </a:xfrm>
           <a:prstGeom prst="rect">
@@ -5779,7 +5780,7 @@
         </p:nvCxnSpPr>
         <p:spPr>
           <a:xfrm flipH="1">
-            <a:off x="7260546" y="5147878"/>
+            <a:off x="7535622" y="5147878"/>
             <a:ext cx="0" cy="900000"/>
           </a:xfrm>
           <a:prstGeom prst="straightConnector1">
@@ -5980,44 +5981,6 @@
           </a:p>
         </p:txBody>
       </p:sp>
-      <p:cxnSp>
-        <p:nvCxnSpPr>
-          <p:cNvPr id="98" name="Straight Connector 97">
-            <a:extLst>
-              <a:ext uri="{FF2B5EF4-FFF2-40B4-BE49-F238E27FC236}">
-                <a16:creationId xmlns:a16="http://schemas.microsoft.com/office/drawing/2014/main" id="{CF03C3A2-5F12-361A-0202-4923CC5AEF56}"/>
-              </a:ext>
-            </a:extLst>
-          </p:cNvPr>
-          <p:cNvCxnSpPr>
-            <a:cxnSpLocks/>
-          </p:cNvCxnSpPr>
-          <p:nvPr/>
-        </p:nvCxnSpPr>
-        <p:spPr>
-          <a:xfrm>
-            <a:off x="7260546" y="6093122"/>
-            <a:ext cx="828000" cy="0"/>
-          </a:xfrm>
-          <a:prstGeom prst="line">
-            <a:avLst/>
-          </a:prstGeom>
-        </p:spPr>
-        <p:style>
-          <a:lnRef idx="2">
-            <a:schemeClr val="accent1"/>
-          </a:lnRef>
-          <a:fillRef idx="0">
-            <a:schemeClr val="accent1"/>
-          </a:fillRef>
-          <a:effectRef idx="1">
-            <a:schemeClr val="accent1"/>
-          </a:effectRef>
-          <a:fontRef idx="minor">
-            <a:schemeClr val="tx1"/>
-          </a:fontRef>
-        </p:style>
-      </p:cxnSp>
       <p:sp>
         <p:nvSpPr>
           <p:cNvPr id="102" name="TextBox 101">
@@ -6172,7 +6135,7 @@
         </p:nvCxnSpPr>
         <p:spPr>
           <a:xfrm>
-            <a:off x="4380546" y="2834348"/>
+            <a:off x="3948546" y="2834348"/>
             <a:ext cx="3240000" cy="0"/>
           </a:xfrm>
           <a:prstGeom prst="line">
@@ -6335,7 +6298,7 @@
         </p:nvCxnSpPr>
         <p:spPr>
           <a:xfrm>
-            <a:off x="4380546" y="2987742"/>
+            <a:off x="3948546" y="2987742"/>
             <a:ext cx="0" cy="900000"/>
           </a:xfrm>
           <a:prstGeom prst="straightConnector1">
@@ -6374,7 +6337,7 @@
         </p:nvSpPr>
         <p:spPr>
           <a:xfrm>
-            <a:off x="4105470" y="2311623"/>
+            <a:off x="3673470" y="2311623"/>
             <a:ext cx="550151" cy="369332"/>
           </a:xfrm>
           <a:prstGeom prst="rect">
@@ -6409,7 +6372,7 @@
         </p:nvSpPr>
         <p:spPr>
           <a:xfrm>
-            <a:off x="7350546" y="2311623"/>
+            <a:off x="6918546" y="2311623"/>
             <a:ext cx="556563" cy="369332"/>
           </a:xfrm>
           <a:prstGeom prst="rect">
@@ -6567,7 +6530,7 @@
         </p:nvCxnSpPr>
         <p:spPr>
           <a:xfrm flipH="1">
-            <a:off x="7620546" y="2987742"/>
+            <a:off x="7188546" y="2987742"/>
             <a:ext cx="0" cy="900000"/>
           </a:xfrm>
           <a:prstGeom prst="straightConnector1">
@@ -8172,7 +8135,7 @@
         </p:nvCxnSpPr>
         <p:spPr>
           <a:xfrm>
-            <a:off x="6063832" y="5014188"/>
+            <a:off x="6815622" y="5014188"/>
             <a:ext cx="3240000" cy="0"/>
           </a:xfrm>
           <a:prstGeom prst="line">
@@ -8215,7 +8178,7 @@
         </p:nvCxnSpPr>
         <p:spPr>
           <a:xfrm>
-            <a:off x="6063832" y="5167582"/>
+            <a:off x="6815622" y="5167582"/>
             <a:ext cx="0" cy="900000"/>
           </a:xfrm>
           <a:prstGeom prst="straightConnector1">
@@ -8254,7 +8217,7 @@
         </p:nvSpPr>
         <p:spPr>
           <a:xfrm>
-            <a:off x="5788756" y="4491463"/>
+            <a:off x="6540546" y="4491463"/>
             <a:ext cx="550151" cy="369332"/>
           </a:xfrm>
           <a:prstGeom prst="rect">
@@ -8289,7 +8252,7 @@
         </p:nvSpPr>
         <p:spPr>
           <a:xfrm>
-            <a:off x="9033832" y="4491463"/>
+            <a:off x="9785622" y="4491463"/>
             <a:ext cx="556563" cy="369332"/>
           </a:xfrm>
           <a:prstGeom prst="rect">
@@ -8327,7 +8290,7 @@
         </p:nvCxnSpPr>
         <p:spPr>
           <a:xfrm flipH="1">
-            <a:off x="9303832" y="5167582"/>
+            <a:off x="10055622" y="5167582"/>
             <a:ext cx="0" cy="900000"/>
           </a:xfrm>
           <a:prstGeom prst="straightConnector1">
@@ -14074,41 +14037,6 @@
       </p:sp>
       <p:sp>
         <p:nvSpPr>
-          <p:cNvPr id="14" name="TextBox 13">
-            <a:extLst>
-              <a:ext uri="{FF2B5EF4-FFF2-40B4-BE49-F238E27FC236}">
-                <a16:creationId xmlns:a16="http://schemas.microsoft.com/office/drawing/2014/main" id="{7BC65194-6E43-E687-48A6-314D4AA6306A}"/>
-              </a:ext>
-            </a:extLst>
-          </p:cNvPr>
-          <p:cNvSpPr txBox="1"/>
-          <p:nvPr/>
-        </p:nvSpPr>
-        <p:spPr>
-          <a:xfrm>
-            <a:off x="6960607" y="6338301"/>
-            <a:ext cx="497252" cy="369332"/>
-          </a:xfrm>
-          <a:prstGeom prst="rect">
-            <a:avLst/>
-          </a:prstGeom>
-          <a:noFill/>
-        </p:spPr>
-        <p:txBody>
-          <a:bodyPr wrap="none" rtlCol="0">
-            <a:spAutoFit/>
-          </a:bodyPr>
-          <a:lstStyle/>
-          <a:p>
-            <a:r>
-              <a:rPr lang="en-GB" dirty="0"/>
-              <a:t>5.5</a:t>
-            </a:r>
-          </a:p>
-        </p:txBody>
-      </p:sp>
-      <p:sp>
-        <p:nvSpPr>
           <p:cNvPr id="43" name="TextBox 42">
             <a:extLst>
               <a:ext uri="{FF2B5EF4-FFF2-40B4-BE49-F238E27FC236}">
@@ -14306,10 +14234,48 @@
       </p:cxnSp>
       <p:cxnSp>
         <p:nvCxnSpPr>
-          <p:cNvPr id="58" name="Straight Connector 57">
-            <a:extLst>
-              <a:ext uri="{FF2B5EF4-FFF2-40B4-BE49-F238E27FC236}">
-                <a16:creationId xmlns:a16="http://schemas.microsoft.com/office/drawing/2014/main" id="{5D7DC160-74CF-5E7F-B30D-1E44C8F2A133}"/>
+          <p:cNvPr id="3" name="Straight Connector 2">
+            <a:extLst>
+              <a:ext uri="{FF2B5EF4-FFF2-40B4-BE49-F238E27FC236}">
+                <a16:creationId xmlns:a16="http://schemas.microsoft.com/office/drawing/2014/main" id="{A65BD5A2-C3DC-6C7C-9EF3-9A78EA81CFD1}"/>
+              </a:ext>
+            </a:extLst>
+          </p:cNvPr>
+          <p:cNvCxnSpPr>
+            <a:cxnSpLocks/>
+          </p:cNvCxnSpPr>
+          <p:nvPr/>
+        </p:nvCxnSpPr>
+        <p:spPr>
+          <a:xfrm>
+            <a:off x="9779859" y="4028661"/>
+            <a:ext cx="108000" cy="0"/>
+          </a:xfrm>
+          <a:prstGeom prst="line">
+            <a:avLst/>
+          </a:prstGeom>
+        </p:spPr>
+        <p:style>
+          <a:lnRef idx="2">
+            <a:schemeClr val="accent1"/>
+          </a:lnRef>
+          <a:fillRef idx="0">
+            <a:schemeClr val="accent1"/>
+          </a:fillRef>
+          <a:effectRef idx="1">
+            <a:schemeClr val="accent1"/>
+          </a:effectRef>
+          <a:fontRef idx="minor">
+            <a:schemeClr val="tx1"/>
+          </a:fontRef>
+        </p:style>
+      </p:cxnSp>
+      <p:cxnSp>
+        <p:nvCxnSpPr>
+          <p:cNvPr id="16" name="Straight Connector 15">
+            <a:extLst>
+              <a:ext uri="{FF2B5EF4-FFF2-40B4-BE49-F238E27FC236}">
+                <a16:creationId xmlns:a16="http://schemas.microsoft.com/office/drawing/2014/main" id="{E38F7135-F2C9-F8FD-0928-AA25C3A891B4}"/>
               </a:ext>
             </a:extLst>
           </p:cNvPr>
@@ -14318,8 +14284,485 @@
         </p:nvCxnSpPr>
         <p:spPr>
           <a:xfrm>
-            <a:off x="168546" y="6193531"/>
-            <a:ext cx="1980000" cy="0"/>
+            <a:off x="9779859" y="3960795"/>
+            <a:ext cx="0" cy="135732"/>
+          </a:xfrm>
+          <a:prstGeom prst="line">
+            <a:avLst/>
+          </a:prstGeom>
+        </p:spPr>
+        <p:style>
+          <a:lnRef idx="2">
+            <a:schemeClr val="accent1"/>
+          </a:lnRef>
+          <a:fillRef idx="0">
+            <a:schemeClr val="accent1"/>
+          </a:fillRef>
+          <a:effectRef idx="1">
+            <a:schemeClr val="accent1"/>
+          </a:effectRef>
+          <a:fontRef idx="minor">
+            <a:schemeClr val="tx1"/>
+          </a:fontRef>
+        </p:style>
+      </p:cxnSp>
+      <p:cxnSp>
+        <p:nvCxnSpPr>
+          <p:cNvPr id="18" name="Straight Connector 17">
+            <a:extLst>
+              <a:ext uri="{FF2B5EF4-FFF2-40B4-BE49-F238E27FC236}">
+                <a16:creationId xmlns:a16="http://schemas.microsoft.com/office/drawing/2014/main" id="{5932DA86-14D4-F953-5299-34F145A0A168}"/>
+              </a:ext>
+            </a:extLst>
+          </p:cNvPr>
+          <p:cNvCxnSpPr>
+            <a:cxnSpLocks/>
+          </p:cNvCxnSpPr>
+          <p:nvPr/>
+        </p:nvCxnSpPr>
+        <p:spPr>
+          <a:xfrm>
+            <a:off x="8159859" y="4028661"/>
+            <a:ext cx="108000" cy="0"/>
+          </a:xfrm>
+          <a:prstGeom prst="line">
+            <a:avLst/>
+          </a:prstGeom>
+        </p:spPr>
+        <p:style>
+          <a:lnRef idx="2">
+            <a:schemeClr val="accent1"/>
+          </a:lnRef>
+          <a:fillRef idx="0">
+            <a:schemeClr val="accent1"/>
+          </a:fillRef>
+          <a:effectRef idx="1">
+            <a:schemeClr val="accent1"/>
+          </a:effectRef>
+          <a:fontRef idx="minor">
+            <a:schemeClr val="tx1"/>
+          </a:fontRef>
+        </p:style>
+      </p:cxnSp>
+      <p:cxnSp>
+        <p:nvCxnSpPr>
+          <p:cNvPr id="19" name="Straight Connector 18">
+            <a:extLst>
+              <a:ext uri="{FF2B5EF4-FFF2-40B4-BE49-F238E27FC236}">
+                <a16:creationId xmlns:a16="http://schemas.microsoft.com/office/drawing/2014/main" id="{ED80366A-0750-E1ED-A5FD-C9D2B5A0DC8E}"/>
+              </a:ext>
+            </a:extLst>
+          </p:cNvPr>
+          <p:cNvCxnSpPr/>
+          <p:nvPr/>
+        </p:nvCxnSpPr>
+        <p:spPr>
+          <a:xfrm>
+            <a:off x="8159859" y="3960795"/>
+            <a:ext cx="0" cy="135732"/>
+          </a:xfrm>
+          <a:prstGeom prst="line">
+            <a:avLst/>
+          </a:prstGeom>
+        </p:spPr>
+        <p:style>
+          <a:lnRef idx="2">
+            <a:schemeClr val="accent1"/>
+          </a:lnRef>
+          <a:fillRef idx="0">
+            <a:schemeClr val="accent1"/>
+          </a:fillRef>
+          <a:effectRef idx="1">
+            <a:schemeClr val="accent1"/>
+          </a:effectRef>
+          <a:fontRef idx="minor">
+            <a:schemeClr val="tx1"/>
+          </a:fontRef>
+        </p:style>
+      </p:cxnSp>
+      <p:cxnSp>
+        <p:nvCxnSpPr>
+          <p:cNvPr id="20" name="Straight Connector 19">
+            <a:extLst>
+              <a:ext uri="{FF2B5EF4-FFF2-40B4-BE49-F238E27FC236}">
+                <a16:creationId xmlns:a16="http://schemas.microsoft.com/office/drawing/2014/main" id="{5EFBC4C8-0E14-AC2C-FC73-C4092418B823}"/>
+              </a:ext>
+            </a:extLst>
+          </p:cNvPr>
+          <p:cNvCxnSpPr>
+            <a:cxnSpLocks/>
+          </p:cNvCxnSpPr>
+          <p:nvPr/>
+        </p:nvCxnSpPr>
+        <p:spPr>
+          <a:xfrm>
+            <a:off x="6539858" y="4028661"/>
+            <a:ext cx="108000" cy="0"/>
+          </a:xfrm>
+          <a:prstGeom prst="line">
+            <a:avLst/>
+          </a:prstGeom>
+        </p:spPr>
+        <p:style>
+          <a:lnRef idx="2">
+            <a:schemeClr val="accent1"/>
+          </a:lnRef>
+          <a:fillRef idx="0">
+            <a:schemeClr val="accent1"/>
+          </a:fillRef>
+          <a:effectRef idx="1">
+            <a:schemeClr val="accent1"/>
+          </a:effectRef>
+          <a:fontRef idx="minor">
+            <a:schemeClr val="tx1"/>
+          </a:fontRef>
+        </p:style>
+      </p:cxnSp>
+      <p:cxnSp>
+        <p:nvCxnSpPr>
+          <p:cNvPr id="21" name="Straight Connector 20">
+            <a:extLst>
+              <a:ext uri="{FF2B5EF4-FFF2-40B4-BE49-F238E27FC236}">
+                <a16:creationId xmlns:a16="http://schemas.microsoft.com/office/drawing/2014/main" id="{C61433D7-FF83-0ECD-9B5B-F8252D5DFA81}"/>
+              </a:ext>
+            </a:extLst>
+          </p:cNvPr>
+          <p:cNvCxnSpPr/>
+          <p:nvPr/>
+        </p:nvCxnSpPr>
+        <p:spPr>
+          <a:xfrm>
+            <a:off x="6539858" y="3960795"/>
+            <a:ext cx="0" cy="135732"/>
+          </a:xfrm>
+          <a:prstGeom prst="line">
+            <a:avLst/>
+          </a:prstGeom>
+        </p:spPr>
+        <p:style>
+          <a:lnRef idx="2">
+            <a:schemeClr val="accent1"/>
+          </a:lnRef>
+          <a:fillRef idx="0">
+            <a:schemeClr val="accent1"/>
+          </a:fillRef>
+          <a:effectRef idx="1">
+            <a:schemeClr val="accent1"/>
+          </a:effectRef>
+          <a:fontRef idx="minor">
+            <a:schemeClr val="tx1"/>
+          </a:fontRef>
+        </p:style>
+      </p:cxnSp>
+      <p:cxnSp>
+        <p:nvCxnSpPr>
+          <p:cNvPr id="22" name="Straight Connector 21">
+            <a:extLst>
+              <a:ext uri="{FF2B5EF4-FFF2-40B4-BE49-F238E27FC236}">
+                <a16:creationId xmlns:a16="http://schemas.microsoft.com/office/drawing/2014/main" id="{178D3448-0963-D6FD-ACCB-0F250326BEF7}"/>
+              </a:ext>
+            </a:extLst>
+          </p:cNvPr>
+          <p:cNvCxnSpPr>
+            <a:cxnSpLocks/>
+          </p:cNvCxnSpPr>
+          <p:nvPr/>
+        </p:nvCxnSpPr>
+        <p:spPr>
+          <a:xfrm>
+            <a:off x="4920546" y="4028661"/>
+            <a:ext cx="108000" cy="0"/>
+          </a:xfrm>
+          <a:prstGeom prst="line">
+            <a:avLst/>
+          </a:prstGeom>
+        </p:spPr>
+        <p:style>
+          <a:lnRef idx="2">
+            <a:schemeClr val="accent1"/>
+          </a:lnRef>
+          <a:fillRef idx="0">
+            <a:schemeClr val="accent1"/>
+          </a:fillRef>
+          <a:effectRef idx="1">
+            <a:schemeClr val="accent1"/>
+          </a:effectRef>
+          <a:fontRef idx="minor">
+            <a:schemeClr val="tx1"/>
+          </a:fontRef>
+        </p:style>
+      </p:cxnSp>
+      <p:cxnSp>
+        <p:nvCxnSpPr>
+          <p:cNvPr id="23" name="Straight Connector 22">
+            <a:extLst>
+              <a:ext uri="{FF2B5EF4-FFF2-40B4-BE49-F238E27FC236}">
+                <a16:creationId xmlns:a16="http://schemas.microsoft.com/office/drawing/2014/main" id="{9A0584E6-5971-A1F2-1967-5E4A9692F612}"/>
+              </a:ext>
+            </a:extLst>
+          </p:cNvPr>
+          <p:cNvCxnSpPr/>
+          <p:nvPr/>
+        </p:nvCxnSpPr>
+        <p:spPr>
+          <a:xfrm>
+            <a:off x="4920546" y="3960795"/>
+            <a:ext cx="0" cy="135732"/>
+          </a:xfrm>
+          <a:prstGeom prst="line">
+            <a:avLst/>
+          </a:prstGeom>
+        </p:spPr>
+        <p:style>
+          <a:lnRef idx="2">
+            <a:schemeClr val="accent1"/>
+          </a:lnRef>
+          <a:fillRef idx="0">
+            <a:schemeClr val="accent1"/>
+          </a:fillRef>
+          <a:effectRef idx="1">
+            <a:schemeClr val="accent1"/>
+          </a:effectRef>
+          <a:fontRef idx="minor">
+            <a:schemeClr val="tx1"/>
+          </a:fontRef>
+        </p:style>
+      </p:cxnSp>
+      <p:cxnSp>
+        <p:nvCxnSpPr>
+          <p:cNvPr id="24" name="Straight Connector 23">
+            <a:extLst>
+              <a:ext uri="{FF2B5EF4-FFF2-40B4-BE49-F238E27FC236}">
+                <a16:creationId xmlns:a16="http://schemas.microsoft.com/office/drawing/2014/main" id="{AD3D9CF9-32C5-E4E6-F833-33EC4EB83E9E}"/>
+              </a:ext>
+            </a:extLst>
+          </p:cNvPr>
+          <p:cNvCxnSpPr>
+            <a:cxnSpLocks/>
+          </p:cNvCxnSpPr>
+          <p:nvPr/>
+        </p:nvCxnSpPr>
+        <p:spPr>
+          <a:xfrm>
+            <a:off x="3300546" y="4028661"/>
+            <a:ext cx="108000" cy="0"/>
+          </a:xfrm>
+          <a:prstGeom prst="line">
+            <a:avLst/>
+          </a:prstGeom>
+        </p:spPr>
+        <p:style>
+          <a:lnRef idx="2">
+            <a:schemeClr val="accent1"/>
+          </a:lnRef>
+          <a:fillRef idx="0">
+            <a:schemeClr val="accent1"/>
+          </a:fillRef>
+          <a:effectRef idx="1">
+            <a:schemeClr val="accent1"/>
+          </a:effectRef>
+          <a:fontRef idx="minor">
+            <a:schemeClr val="tx1"/>
+          </a:fontRef>
+        </p:style>
+      </p:cxnSp>
+      <p:cxnSp>
+        <p:nvCxnSpPr>
+          <p:cNvPr id="25" name="Straight Connector 24">
+            <a:extLst>
+              <a:ext uri="{FF2B5EF4-FFF2-40B4-BE49-F238E27FC236}">
+                <a16:creationId xmlns:a16="http://schemas.microsoft.com/office/drawing/2014/main" id="{736A730C-434D-8803-9E96-9846A31B11D0}"/>
+              </a:ext>
+            </a:extLst>
+          </p:cNvPr>
+          <p:cNvCxnSpPr/>
+          <p:nvPr/>
+        </p:nvCxnSpPr>
+        <p:spPr>
+          <a:xfrm>
+            <a:off x="3300546" y="3960795"/>
+            <a:ext cx="0" cy="135732"/>
+          </a:xfrm>
+          <a:prstGeom prst="line">
+            <a:avLst/>
+          </a:prstGeom>
+        </p:spPr>
+        <p:style>
+          <a:lnRef idx="2">
+            <a:schemeClr val="accent1"/>
+          </a:lnRef>
+          <a:fillRef idx="0">
+            <a:schemeClr val="accent1"/>
+          </a:fillRef>
+          <a:effectRef idx="1">
+            <a:schemeClr val="accent1"/>
+          </a:effectRef>
+          <a:fontRef idx="minor">
+            <a:schemeClr val="tx1"/>
+          </a:fontRef>
+        </p:style>
+      </p:cxnSp>
+      <p:cxnSp>
+        <p:nvCxnSpPr>
+          <p:cNvPr id="26" name="Straight Connector 25">
+            <a:extLst>
+              <a:ext uri="{FF2B5EF4-FFF2-40B4-BE49-F238E27FC236}">
+                <a16:creationId xmlns:a16="http://schemas.microsoft.com/office/drawing/2014/main" id="{400B5937-A4FA-C6C2-F665-1DC1E2C73014}"/>
+              </a:ext>
+            </a:extLst>
+          </p:cNvPr>
+          <p:cNvCxnSpPr>
+            <a:cxnSpLocks/>
+          </p:cNvCxnSpPr>
+          <p:nvPr/>
+        </p:nvCxnSpPr>
+        <p:spPr>
+          <a:xfrm>
+            <a:off x="1680545" y="4028661"/>
+            <a:ext cx="108000" cy="0"/>
+          </a:xfrm>
+          <a:prstGeom prst="line">
+            <a:avLst/>
+          </a:prstGeom>
+        </p:spPr>
+        <p:style>
+          <a:lnRef idx="2">
+            <a:schemeClr val="accent1"/>
+          </a:lnRef>
+          <a:fillRef idx="0">
+            <a:schemeClr val="accent1"/>
+          </a:fillRef>
+          <a:effectRef idx="1">
+            <a:schemeClr val="accent1"/>
+          </a:effectRef>
+          <a:fontRef idx="minor">
+            <a:schemeClr val="tx1"/>
+          </a:fontRef>
+        </p:style>
+      </p:cxnSp>
+      <p:cxnSp>
+        <p:nvCxnSpPr>
+          <p:cNvPr id="27" name="Straight Connector 26">
+            <a:extLst>
+              <a:ext uri="{FF2B5EF4-FFF2-40B4-BE49-F238E27FC236}">
+                <a16:creationId xmlns:a16="http://schemas.microsoft.com/office/drawing/2014/main" id="{5F74E0C3-E7D1-0BF3-D1D0-B1A70B0232C3}"/>
+              </a:ext>
+            </a:extLst>
+          </p:cNvPr>
+          <p:cNvCxnSpPr/>
+          <p:nvPr/>
+        </p:nvCxnSpPr>
+        <p:spPr>
+          <a:xfrm>
+            <a:off x="1680545" y="3960795"/>
+            <a:ext cx="0" cy="135732"/>
+          </a:xfrm>
+          <a:prstGeom prst="line">
+            <a:avLst/>
+          </a:prstGeom>
+        </p:spPr>
+        <p:style>
+          <a:lnRef idx="2">
+            <a:schemeClr val="accent1"/>
+          </a:lnRef>
+          <a:fillRef idx="0">
+            <a:schemeClr val="accent1"/>
+          </a:fillRef>
+          <a:effectRef idx="1">
+            <a:schemeClr val="accent1"/>
+          </a:effectRef>
+          <a:fontRef idx="minor">
+            <a:schemeClr val="tx1"/>
+          </a:fontRef>
+        </p:style>
+      </p:cxnSp>
+      <p:sp>
+        <p:nvSpPr>
+          <p:cNvPr id="93" name="TextBox 92">
+            <a:extLst>
+              <a:ext uri="{FF2B5EF4-FFF2-40B4-BE49-F238E27FC236}">
+                <a16:creationId xmlns:a16="http://schemas.microsoft.com/office/drawing/2014/main" id="{238F36BB-6458-1DBE-92F9-18C8690C0594}"/>
+              </a:ext>
+            </a:extLst>
+          </p:cNvPr>
+          <p:cNvSpPr txBox="1"/>
+          <p:nvPr/>
+        </p:nvSpPr>
+        <p:spPr>
+          <a:xfrm>
+            <a:off x="507270" y="4292713"/>
+            <a:ext cx="497252" cy="369332"/>
+          </a:xfrm>
+          <a:prstGeom prst="rect">
+            <a:avLst/>
+          </a:prstGeom>
+          <a:noFill/>
+        </p:spPr>
+        <p:txBody>
+          <a:bodyPr wrap="none" rtlCol="0">
+            <a:spAutoFit/>
+          </a:bodyPr>
+          <a:lstStyle/>
+          <a:p>
+            <a:r>
+              <a:rPr lang="en-GB" dirty="0"/>
+              <a:t>4.5</a:t>
+            </a:r>
+          </a:p>
+        </p:txBody>
+      </p:sp>
+      <p:sp>
+        <p:nvSpPr>
+          <p:cNvPr id="102" name="TextBox 101">
+            <a:extLst>
+              <a:ext uri="{FF2B5EF4-FFF2-40B4-BE49-F238E27FC236}">
+                <a16:creationId xmlns:a16="http://schemas.microsoft.com/office/drawing/2014/main" id="{54472C58-05E0-7EAD-1AA1-3CBB53C7234C}"/>
+              </a:ext>
+            </a:extLst>
+          </p:cNvPr>
+          <p:cNvSpPr txBox="1"/>
+          <p:nvPr/>
+        </p:nvSpPr>
+        <p:spPr>
+          <a:xfrm>
+            <a:off x="10697859" y="4360062"/>
+            <a:ext cx="556563" cy="369332"/>
+          </a:xfrm>
+          <a:prstGeom prst="rect">
+            <a:avLst/>
+          </a:prstGeom>
+          <a:noFill/>
+        </p:spPr>
+        <p:txBody>
+          <a:bodyPr wrap="none" rtlCol="0">
+            <a:spAutoFit/>
+          </a:bodyPr>
+          <a:lstStyle/>
+          <a:p>
+            <a:r>
+              <a:rPr lang="en-GB" dirty="0" err="1"/>
+              <a:t>dsp</a:t>
+            </a:r>
+            <a:endParaRPr lang="en-GB" dirty="0"/>
+          </a:p>
+        </p:txBody>
+      </p:sp>
+      <p:cxnSp>
+        <p:nvCxnSpPr>
+          <p:cNvPr id="2" name="Straight Connector 1">
+            <a:extLst>
+              <a:ext uri="{FF2B5EF4-FFF2-40B4-BE49-F238E27FC236}">
+                <a16:creationId xmlns:a16="http://schemas.microsoft.com/office/drawing/2014/main" id="{889E556C-1884-1604-6392-0C328A604638}"/>
+              </a:ext>
+            </a:extLst>
+          </p:cNvPr>
+          <p:cNvCxnSpPr/>
+          <p:nvPr/>
+        </p:nvCxnSpPr>
+        <p:spPr>
+          <a:xfrm>
+            <a:off x="9887859" y="4028661"/>
+            <a:ext cx="1620000" cy="0"/>
           </a:xfrm>
           <a:prstGeom prst="line">
             <a:avLst/>
@@ -14346,370 +14789,10 @@
       </p:cxnSp>
       <p:cxnSp>
         <p:nvCxnSpPr>
-          <p:cNvPr id="59" name="Straight Connector 58">
-            <a:extLst>
-              <a:ext uri="{FF2B5EF4-FFF2-40B4-BE49-F238E27FC236}">
-                <a16:creationId xmlns:a16="http://schemas.microsoft.com/office/drawing/2014/main" id="{4D03BEA4-7B5D-78AC-3C3B-7DC8D096600D}"/>
-              </a:ext>
-            </a:extLst>
-          </p:cNvPr>
-          <p:cNvCxnSpPr/>
-          <p:nvPr/>
-        </p:nvCxnSpPr>
-        <p:spPr>
-          <a:xfrm>
-            <a:off x="2148546" y="6193531"/>
-            <a:ext cx="1980000" cy="0"/>
-          </a:xfrm>
-          <a:prstGeom prst="line">
-            <a:avLst/>
-          </a:prstGeom>
-          <a:ln>
-            <a:headEnd type="oval" w="med" len="med"/>
-            <a:tailEnd type="oval" w="med" len="med"/>
-          </a:ln>
-        </p:spPr>
-        <p:style>
-          <a:lnRef idx="2">
-            <a:schemeClr val="accent6"/>
-          </a:lnRef>
-          <a:fillRef idx="0">
-            <a:schemeClr val="accent6"/>
-          </a:fillRef>
-          <a:effectRef idx="1">
-            <a:schemeClr val="accent6"/>
-          </a:effectRef>
-          <a:fontRef idx="minor">
-            <a:schemeClr val="tx1"/>
-          </a:fontRef>
-        </p:style>
-      </p:cxnSp>
-      <p:cxnSp>
-        <p:nvCxnSpPr>
-          <p:cNvPr id="60" name="Straight Connector 59">
-            <a:extLst>
-              <a:ext uri="{FF2B5EF4-FFF2-40B4-BE49-F238E27FC236}">
-                <a16:creationId xmlns:a16="http://schemas.microsoft.com/office/drawing/2014/main" id="{27CEE809-672B-22B0-A057-BBA52E897FA8}"/>
-              </a:ext>
-            </a:extLst>
-          </p:cNvPr>
-          <p:cNvCxnSpPr/>
-          <p:nvPr/>
-        </p:nvCxnSpPr>
-        <p:spPr>
-          <a:xfrm>
-            <a:off x="4128546" y="6193531"/>
-            <a:ext cx="1980000" cy="0"/>
-          </a:xfrm>
-          <a:prstGeom prst="line">
-            <a:avLst/>
-          </a:prstGeom>
-          <a:ln>
-            <a:headEnd type="oval" w="med" len="med"/>
-            <a:tailEnd type="oval" w="med" len="med"/>
-          </a:ln>
-        </p:spPr>
-        <p:style>
-          <a:lnRef idx="2">
-            <a:schemeClr val="accent6"/>
-          </a:lnRef>
-          <a:fillRef idx="0">
-            <a:schemeClr val="accent6"/>
-          </a:fillRef>
-          <a:effectRef idx="1">
-            <a:schemeClr val="accent6"/>
-          </a:effectRef>
-          <a:fontRef idx="minor">
-            <a:schemeClr val="tx1"/>
-          </a:fontRef>
-        </p:style>
-      </p:cxnSp>
-      <p:cxnSp>
-        <p:nvCxnSpPr>
-          <p:cNvPr id="61" name="Straight Connector 60">
-            <a:extLst>
-              <a:ext uri="{FF2B5EF4-FFF2-40B4-BE49-F238E27FC236}">
-                <a16:creationId xmlns:a16="http://schemas.microsoft.com/office/drawing/2014/main" id="{2E366302-09DD-B7DD-3FAC-B205ADE5403E}"/>
-              </a:ext>
-            </a:extLst>
-          </p:cNvPr>
-          <p:cNvCxnSpPr/>
-          <p:nvPr/>
-        </p:nvCxnSpPr>
-        <p:spPr>
-          <a:xfrm>
-            <a:off x="6108546" y="6193531"/>
-            <a:ext cx="1980000" cy="0"/>
-          </a:xfrm>
-          <a:prstGeom prst="line">
-            <a:avLst/>
-          </a:prstGeom>
-          <a:ln>
-            <a:headEnd type="oval" w="med" len="med"/>
-            <a:tailEnd type="oval" w="med" len="med"/>
-          </a:ln>
-        </p:spPr>
-        <p:style>
-          <a:lnRef idx="2">
-            <a:schemeClr val="accent6"/>
-          </a:lnRef>
-          <a:fillRef idx="0">
-            <a:schemeClr val="accent6"/>
-          </a:fillRef>
-          <a:effectRef idx="1">
-            <a:schemeClr val="accent6"/>
-          </a:effectRef>
-          <a:fontRef idx="minor">
-            <a:schemeClr val="tx1"/>
-          </a:fontRef>
-        </p:style>
-      </p:cxnSp>
-      <p:cxnSp>
-        <p:nvCxnSpPr>
-          <p:cNvPr id="64" name="Straight Connector 63">
-            <a:extLst>
-              <a:ext uri="{FF2B5EF4-FFF2-40B4-BE49-F238E27FC236}">
-                <a16:creationId xmlns:a16="http://schemas.microsoft.com/office/drawing/2014/main" id="{7332D927-96CA-AF9F-722C-77B56A295A87}"/>
-              </a:ext>
-            </a:extLst>
-          </p:cNvPr>
-          <p:cNvCxnSpPr/>
-          <p:nvPr/>
-        </p:nvCxnSpPr>
-        <p:spPr>
-          <a:xfrm>
-            <a:off x="168546" y="1856050"/>
-            <a:ext cx="1440000" cy="0"/>
-          </a:xfrm>
-          <a:prstGeom prst="line">
-            <a:avLst/>
-          </a:prstGeom>
-          <a:ln>
-            <a:headEnd type="oval" w="med" len="med"/>
-            <a:tailEnd type="oval" w="med" len="med"/>
-          </a:ln>
-        </p:spPr>
-        <p:style>
-          <a:lnRef idx="2">
-            <a:schemeClr val="accent6"/>
-          </a:lnRef>
-          <a:fillRef idx="0">
-            <a:schemeClr val="accent6"/>
-          </a:fillRef>
-          <a:effectRef idx="1">
-            <a:schemeClr val="accent6"/>
-          </a:effectRef>
-          <a:fontRef idx="minor">
-            <a:schemeClr val="tx1"/>
-          </a:fontRef>
-        </p:style>
-      </p:cxnSp>
-      <p:cxnSp>
-        <p:nvCxnSpPr>
-          <p:cNvPr id="65" name="Straight Connector 64">
-            <a:extLst>
-              <a:ext uri="{FF2B5EF4-FFF2-40B4-BE49-F238E27FC236}">
-                <a16:creationId xmlns:a16="http://schemas.microsoft.com/office/drawing/2014/main" id="{FB6567BC-F60D-9E21-5C84-40E2C4C8A4BE}"/>
-              </a:ext>
-            </a:extLst>
-          </p:cNvPr>
-          <p:cNvCxnSpPr/>
-          <p:nvPr/>
-        </p:nvCxnSpPr>
-        <p:spPr>
-          <a:xfrm>
-            <a:off x="1608546" y="1856050"/>
-            <a:ext cx="1440000" cy="0"/>
-          </a:xfrm>
-          <a:prstGeom prst="line">
-            <a:avLst/>
-          </a:prstGeom>
-          <a:ln>
-            <a:headEnd type="oval" w="med" len="med"/>
-            <a:tailEnd type="oval" w="med" len="med"/>
-          </a:ln>
-        </p:spPr>
-        <p:style>
-          <a:lnRef idx="2">
-            <a:schemeClr val="accent6"/>
-          </a:lnRef>
-          <a:fillRef idx="0">
-            <a:schemeClr val="accent6"/>
-          </a:fillRef>
-          <a:effectRef idx="1">
-            <a:schemeClr val="accent6"/>
-          </a:effectRef>
-          <a:fontRef idx="minor">
-            <a:schemeClr val="tx1"/>
-          </a:fontRef>
-        </p:style>
-      </p:cxnSp>
-      <p:cxnSp>
-        <p:nvCxnSpPr>
-          <p:cNvPr id="66" name="Straight Connector 65">
-            <a:extLst>
-              <a:ext uri="{FF2B5EF4-FFF2-40B4-BE49-F238E27FC236}">
-                <a16:creationId xmlns:a16="http://schemas.microsoft.com/office/drawing/2014/main" id="{04DC2E77-321F-49D8-477B-10948DD8AA6B}"/>
-              </a:ext>
-            </a:extLst>
-          </p:cNvPr>
-          <p:cNvCxnSpPr/>
-          <p:nvPr/>
-        </p:nvCxnSpPr>
-        <p:spPr>
-          <a:xfrm>
-            <a:off x="3048546" y="1856050"/>
-            <a:ext cx="1440000" cy="0"/>
-          </a:xfrm>
-          <a:prstGeom prst="line">
-            <a:avLst/>
-          </a:prstGeom>
-          <a:ln>
-            <a:headEnd type="oval" w="med" len="med"/>
-            <a:tailEnd type="oval" w="med" len="med"/>
-          </a:ln>
-        </p:spPr>
-        <p:style>
-          <a:lnRef idx="2">
-            <a:schemeClr val="accent6"/>
-          </a:lnRef>
-          <a:fillRef idx="0">
-            <a:schemeClr val="accent6"/>
-          </a:fillRef>
-          <a:effectRef idx="1">
-            <a:schemeClr val="accent6"/>
-          </a:effectRef>
-          <a:fontRef idx="minor">
-            <a:schemeClr val="tx1"/>
-          </a:fontRef>
-        </p:style>
-      </p:cxnSp>
-      <p:cxnSp>
-        <p:nvCxnSpPr>
-          <p:cNvPr id="67" name="Straight Connector 66">
-            <a:extLst>
-              <a:ext uri="{FF2B5EF4-FFF2-40B4-BE49-F238E27FC236}">
-                <a16:creationId xmlns:a16="http://schemas.microsoft.com/office/drawing/2014/main" id="{9BC047E7-26CF-843C-A988-0F42EA1CFC7D}"/>
-              </a:ext>
-            </a:extLst>
-          </p:cNvPr>
-          <p:cNvCxnSpPr/>
-          <p:nvPr/>
-        </p:nvCxnSpPr>
-        <p:spPr>
-          <a:xfrm>
-            <a:off x="4488546" y="1856050"/>
-            <a:ext cx="1440000" cy="0"/>
-          </a:xfrm>
-          <a:prstGeom prst="line">
-            <a:avLst/>
-          </a:prstGeom>
-          <a:ln>
-            <a:headEnd type="oval" w="med" len="med"/>
-            <a:tailEnd type="oval" w="med" len="med"/>
-          </a:ln>
-        </p:spPr>
-        <p:style>
-          <a:lnRef idx="2">
-            <a:schemeClr val="accent6"/>
-          </a:lnRef>
-          <a:fillRef idx="0">
-            <a:schemeClr val="accent6"/>
-          </a:fillRef>
-          <a:effectRef idx="1">
-            <a:schemeClr val="accent6"/>
-          </a:effectRef>
-          <a:fontRef idx="minor">
-            <a:schemeClr val="tx1"/>
-          </a:fontRef>
-        </p:style>
-      </p:cxnSp>
-      <p:cxnSp>
-        <p:nvCxnSpPr>
-          <p:cNvPr id="68" name="Straight Connector 67">
-            <a:extLst>
-              <a:ext uri="{FF2B5EF4-FFF2-40B4-BE49-F238E27FC236}">
-                <a16:creationId xmlns:a16="http://schemas.microsoft.com/office/drawing/2014/main" id="{0DD0B3AE-A0D7-77DB-9B44-ADD1E7ED9943}"/>
-              </a:ext>
-            </a:extLst>
-          </p:cNvPr>
-          <p:cNvCxnSpPr/>
-          <p:nvPr/>
-        </p:nvCxnSpPr>
-        <p:spPr>
-          <a:xfrm>
-            <a:off x="5928546" y="1856050"/>
-            <a:ext cx="1440000" cy="0"/>
-          </a:xfrm>
-          <a:prstGeom prst="line">
-            <a:avLst/>
-          </a:prstGeom>
-          <a:ln>
-            <a:headEnd type="oval" w="med" len="med"/>
-            <a:tailEnd type="oval" w="med" len="med"/>
-          </a:ln>
-        </p:spPr>
-        <p:style>
-          <a:lnRef idx="2">
-            <a:schemeClr val="accent6"/>
-          </a:lnRef>
-          <a:fillRef idx="0">
-            <a:schemeClr val="accent6"/>
-          </a:fillRef>
-          <a:effectRef idx="1">
-            <a:schemeClr val="accent6"/>
-          </a:effectRef>
-          <a:fontRef idx="minor">
-            <a:schemeClr val="tx1"/>
-          </a:fontRef>
-        </p:style>
-      </p:cxnSp>
-      <p:cxnSp>
-        <p:nvCxnSpPr>
-          <p:cNvPr id="69" name="Straight Connector 68">
-            <a:extLst>
-              <a:ext uri="{FF2B5EF4-FFF2-40B4-BE49-F238E27FC236}">
-                <a16:creationId xmlns:a16="http://schemas.microsoft.com/office/drawing/2014/main" id="{9B394032-0C58-A480-9B1F-B5BA30439F59}"/>
-              </a:ext>
-            </a:extLst>
-          </p:cNvPr>
-          <p:cNvCxnSpPr/>
-          <p:nvPr/>
-        </p:nvCxnSpPr>
-        <p:spPr>
-          <a:xfrm>
-            <a:off x="7368546" y="1856050"/>
-            <a:ext cx="1440000" cy="0"/>
-          </a:xfrm>
-          <a:prstGeom prst="line">
-            <a:avLst/>
-          </a:prstGeom>
-          <a:ln>
-            <a:headEnd type="oval" w="med" len="med"/>
-            <a:tailEnd type="oval" w="med" len="med"/>
-          </a:ln>
-        </p:spPr>
-        <p:style>
-          <a:lnRef idx="2">
-            <a:schemeClr val="accent6"/>
-          </a:lnRef>
-          <a:fillRef idx="0">
-            <a:schemeClr val="accent6"/>
-          </a:fillRef>
-          <a:effectRef idx="1">
-            <a:schemeClr val="accent6"/>
-          </a:effectRef>
-          <a:fontRef idx="minor">
-            <a:schemeClr val="tx1"/>
-          </a:fontRef>
-        </p:style>
-      </p:cxnSp>
-      <p:cxnSp>
-        <p:nvCxnSpPr>
-          <p:cNvPr id="3" name="Straight Connector 2">
-            <a:extLst>
-              <a:ext uri="{FF2B5EF4-FFF2-40B4-BE49-F238E27FC236}">
-                <a16:creationId xmlns:a16="http://schemas.microsoft.com/office/drawing/2014/main" id="{A65BD5A2-C3DC-6C7C-9EF3-9A78EA81CFD1}"/>
+          <p:cNvPr id="4" name="Straight Connector 3">
+            <a:extLst>
+              <a:ext uri="{FF2B5EF4-FFF2-40B4-BE49-F238E27FC236}">
+                <a16:creationId xmlns:a16="http://schemas.microsoft.com/office/drawing/2014/main" id="{A945A4D7-614D-F924-2460-9AF79CE0F0F1}"/>
               </a:ext>
             </a:extLst>
           </p:cNvPr>
@@ -14720,7 +14803,7 @@
         </p:nvCxnSpPr>
         <p:spPr>
           <a:xfrm>
-            <a:off x="9779859" y="4028661"/>
+            <a:off x="11399859" y="4028661"/>
             <a:ext cx="108000" cy="0"/>
           </a:xfrm>
           <a:prstGeom prst="line">
@@ -14744,10 +14827,10 @@
       </p:cxnSp>
       <p:cxnSp>
         <p:nvCxnSpPr>
-          <p:cNvPr id="16" name="Straight Connector 15">
-            <a:extLst>
-              <a:ext uri="{FF2B5EF4-FFF2-40B4-BE49-F238E27FC236}">
-                <a16:creationId xmlns:a16="http://schemas.microsoft.com/office/drawing/2014/main" id="{E38F7135-F2C9-F8FD-0928-AA25C3A891B4}"/>
+          <p:cNvPr id="9" name="Straight Connector 8">
+            <a:extLst>
+              <a:ext uri="{FF2B5EF4-FFF2-40B4-BE49-F238E27FC236}">
+                <a16:creationId xmlns:a16="http://schemas.microsoft.com/office/drawing/2014/main" id="{25EF4A3B-2113-91AF-466D-225D505E2EDE}"/>
               </a:ext>
             </a:extLst>
           </p:cNvPr>
@@ -14756,7 +14839,7 @@
         </p:nvCxnSpPr>
         <p:spPr>
           <a:xfrm>
-            <a:off x="9779859" y="3960795"/>
+            <a:off x="11399859" y="3960795"/>
             <a:ext cx="0" cy="135732"/>
           </a:xfrm>
           <a:prstGeom prst="line">
@@ -14778,50 +14861,42 @@
           </a:fontRef>
         </p:style>
       </p:cxnSp>
-      <p:cxnSp>
-        <p:nvCxnSpPr>
-          <p:cNvPr id="18" name="Straight Connector 17">
-            <a:extLst>
-              <a:ext uri="{FF2B5EF4-FFF2-40B4-BE49-F238E27FC236}">
-                <a16:creationId xmlns:a16="http://schemas.microsoft.com/office/drawing/2014/main" id="{5932DA86-14D4-F953-5299-34F145A0A168}"/>
-              </a:ext>
-            </a:extLst>
-          </p:cNvPr>
-          <p:cNvCxnSpPr>
-            <a:cxnSpLocks/>
-          </p:cNvCxnSpPr>
-          <p:nvPr/>
-        </p:nvCxnSpPr>
-        <p:spPr>
-          <a:xfrm>
-            <a:off x="8159859" y="4028661"/>
-            <a:ext cx="108000" cy="0"/>
-          </a:xfrm>
-          <a:prstGeom prst="line">
-            <a:avLst/>
-          </a:prstGeom>
-        </p:spPr>
-        <p:style>
-          <a:lnRef idx="2">
-            <a:schemeClr val="accent1"/>
-          </a:lnRef>
-          <a:fillRef idx="0">
-            <a:schemeClr val="accent1"/>
-          </a:fillRef>
-          <a:effectRef idx="1">
-            <a:schemeClr val="accent1"/>
-          </a:effectRef>
-          <a:fontRef idx="minor">
-            <a:schemeClr val="tx1"/>
-          </a:fontRef>
-        </p:style>
-      </p:cxnSp>
-      <p:cxnSp>
-        <p:nvCxnSpPr>
-          <p:cNvPr id="19" name="Straight Connector 18">
-            <a:extLst>
-              <a:ext uri="{FF2B5EF4-FFF2-40B4-BE49-F238E27FC236}">
-                <a16:creationId xmlns:a16="http://schemas.microsoft.com/office/drawing/2014/main" id="{ED80366A-0750-E1ED-A5FD-C9D2B5A0DC8E}"/>
+    </p:spTree>
+    <p:extLst>
+      <p:ext uri="{BB962C8B-B14F-4D97-AF65-F5344CB8AC3E}">
+        <p14:creationId xmlns:p14="http://schemas.microsoft.com/office/powerpoint/2010/main" val="731477823"/>
+      </p:ext>
+    </p:extLst>
+  </p:cSld>
+  <p:clrMapOvr>
+    <a:masterClrMapping/>
+  </p:clrMapOvr>
+</p:sld>
+</file>
+
+<file path=ppt/slides/slide6.xml><?xml version="1.0" encoding="utf-8"?>
+<p:sld xmlns:a="http://schemas.openxmlformats.org/drawingml/2006/main" xmlns:r="http://schemas.openxmlformats.org/officeDocument/2006/relationships" xmlns:p="http://schemas.openxmlformats.org/presentationml/2006/main">
+  <p:cSld>
+    <p:spTree>
+      <p:nvGrpSpPr>
+        <p:cNvPr id="1" name=""/>
+        <p:cNvGrpSpPr/>
+        <p:nvPr/>
+      </p:nvGrpSpPr>
+      <p:grpSpPr>
+        <a:xfrm>
+          <a:off x="0" y="0"/>
+          <a:ext cx="0" cy="0"/>
+          <a:chOff x="0" y="0"/>
+          <a:chExt cx="0" cy="0"/>
+        </a:xfrm>
+      </p:grpSpPr>
+      <p:cxnSp>
+        <p:nvCxnSpPr>
+          <p:cNvPr id="5" name="Straight Connector 4">
+            <a:extLst>
+              <a:ext uri="{FF2B5EF4-FFF2-40B4-BE49-F238E27FC236}">
+                <a16:creationId xmlns:a16="http://schemas.microsoft.com/office/drawing/2014/main" id="{C69E5475-58AE-2AE1-194E-6CEB582BA1D6}"/>
               </a:ext>
             </a:extLst>
           </p:cNvPr>
@@ -14830,1091 +14905,7 @@
         </p:nvCxnSpPr>
         <p:spPr>
           <a:xfrm>
-            <a:off x="8159859" y="3960795"/>
-            <a:ext cx="0" cy="135732"/>
-          </a:xfrm>
-          <a:prstGeom prst="line">
-            <a:avLst/>
-          </a:prstGeom>
-        </p:spPr>
-        <p:style>
-          <a:lnRef idx="2">
-            <a:schemeClr val="accent1"/>
-          </a:lnRef>
-          <a:fillRef idx="0">
-            <a:schemeClr val="accent1"/>
-          </a:fillRef>
-          <a:effectRef idx="1">
-            <a:schemeClr val="accent1"/>
-          </a:effectRef>
-          <a:fontRef idx="minor">
-            <a:schemeClr val="tx1"/>
-          </a:fontRef>
-        </p:style>
-      </p:cxnSp>
-      <p:cxnSp>
-        <p:nvCxnSpPr>
-          <p:cNvPr id="20" name="Straight Connector 19">
-            <a:extLst>
-              <a:ext uri="{FF2B5EF4-FFF2-40B4-BE49-F238E27FC236}">
-                <a16:creationId xmlns:a16="http://schemas.microsoft.com/office/drawing/2014/main" id="{5EFBC4C8-0E14-AC2C-FC73-C4092418B823}"/>
-              </a:ext>
-            </a:extLst>
-          </p:cNvPr>
-          <p:cNvCxnSpPr>
-            <a:cxnSpLocks/>
-          </p:cNvCxnSpPr>
-          <p:nvPr/>
-        </p:nvCxnSpPr>
-        <p:spPr>
-          <a:xfrm>
-            <a:off x="6539858" y="4028661"/>
-            <a:ext cx="108000" cy="0"/>
-          </a:xfrm>
-          <a:prstGeom prst="line">
-            <a:avLst/>
-          </a:prstGeom>
-        </p:spPr>
-        <p:style>
-          <a:lnRef idx="2">
-            <a:schemeClr val="accent1"/>
-          </a:lnRef>
-          <a:fillRef idx="0">
-            <a:schemeClr val="accent1"/>
-          </a:fillRef>
-          <a:effectRef idx="1">
-            <a:schemeClr val="accent1"/>
-          </a:effectRef>
-          <a:fontRef idx="minor">
-            <a:schemeClr val="tx1"/>
-          </a:fontRef>
-        </p:style>
-      </p:cxnSp>
-      <p:cxnSp>
-        <p:nvCxnSpPr>
-          <p:cNvPr id="21" name="Straight Connector 20">
-            <a:extLst>
-              <a:ext uri="{FF2B5EF4-FFF2-40B4-BE49-F238E27FC236}">
-                <a16:creationId xmlns:a16="http://schemas.microsoft.com/office/drawing/2014/main" id="{C61433D7-FF83-0ECD-9B5B-F8252D5DFA81}"/>
-              </a:ext>
-            </a:extLst>
-          </p:cNvPr>
-          <p:cNvCxnSpPr/>
-          <p:nvPr/>
-        </p:nvCxnSpPr>
-        <p:spPr>
-          <a:xfrm>
-            <a:off x="6539858" y="3960795"/>
-            <a:ext cx="0" cy="135732"/>
-          </a:xfrm>
-          <a:prstGeom prst="line">
-            <a:avLst/>
-          </a:prstGeom>
-        </p:spPr>
-        <p:style>
-          <a:lnRef idx="2">
-            <a:schemeClr val="accent1"/>
-          </a:lnRef>
-          <a:fillRef idx="0">
-            <a:schemeClr val="accent1"/>
-          </a:fillRef>
-          <a:effectRef idx="1">
-            <a:schemeClr val="accent1"/>
-          </a:effectRef>
-          <a:fontRef idx="minor">
-            <a:schemeClr val="tx1"/>
-          </a:fontRef>
-        </p:style>
-      </p:cxnSp>
-      <p:cxnSp>
-        <p:nvCxnSpPr>
-          <p:cNvPr id="22" name="Straight Connector 21">
-            <a:extLst>
-              <a:ext uri="{FF2B5EF4-FFF2-40B4-BE49-F238E27FC236}">
-                <a16:creationId xmlns:a16="http://schemas.microsoft.com/office/drawing/2014/main" id="{178D3448-0963-D6FD-ACCB-0F250326BEF7}"/>
-              </a:ext>
-            </a:extLst>
-          </p:cNvPr>
-          <p:cNvCxnSpPr>
-            <a:cxnSpLocks/>
-          </p:cNvCxnSpPr>
-          <p:nvPr/>
-        </p:nvCxnSpPr>
-        <p:spPr>
-          <a:xfrm>
-            <a:off x="4920546" y="4028661"/>
-            <a:ext cx="108000" cy="0"/>
-          </a:xfrm>
-          <a:prstGeom prst="line">
-            <a:avLst/>
-          </a:prstGeom>
-        </p:spPr>
-        <p:style>
-          <a:lnRef idx="2">
-            <a:schemeClr val="accent1"/>
-          </a:lnRef>
-          <a:fillRef idx="0">
-            <a:schemeClr val="accent1"/>
-          </a:fillRef>
-          <a:effectRef idx="1">
-            <a:schemeClr val="accent1"/>
-          </a:effectRef>
-          <a:fontRef idx="minor">
-            <a:schemeClr val="tx1"/>
-          </a:fontRef>
-        </p:style>
-      </p:cxnSp>
-      <p:cxnSp>
-        <p:nvCxnSpPr>
-          <p:cNvPr id="23" name="Straight Connector 22">
-            <a:extLst>
-              <a:ext uri="{FF2B5EF4-FFF2-40B4-BE49-F238E27FC236}">
-                <a16:creationId xmlns:a16="http://schemas.microsoft.com/office/drawing/2014/main" id="{9A0584E6-5971-A1F2-1967-5E4A9692F612}"/>
-              </a:ext>
-            </a:extLst>
-          </p:cNvPr>
-          <p:cNvCxnSpPr/>
-          <p:nvPr/>
-        </p:nvCxnSpPr>
-        <p:spPr>
-          <a:xfrm>
-            <a:off x="4920546" y="3960795"/>
-            <a:ext cx="0" cy="135732"/>
-          </a:xfrm>
-          <a:prstGeom prst="line">
-            <a:avLst/>
-          </a:prstGeom>
-        </p:spPr>
-        <p:style>
-          <a:lnRef idx="2">
-            <a:schemeClr val="accent1"/>
-          </a:lnRef>
-          <a:fillRef idx="0">
-            <a:schemeClr val="accent1"/>
-          </a:fillRef>
-          <a:effectRef idx="1">
-            <a:schemeClr val="accent1"/>
-          </a:effectRef>
-          <a:fontRef idx="minor">
-            <a:schemeClr val="tx1"/>
-          </a:fontRef>
-        </p:style>
-      </p:cxnSp>
-      <p:cxnSp>
-        <p:nvCxnSpPr>
-          <p:cNvPr id="24" name="Straight Connector 23">
-            <a:extLst>
-              <a:ext uri="{FF2B5EF4-FFF2-40B4-BE49-F238E27FC236}">
-                <a16:creationId xmlns:a16="http://schemas.microsoft.com/office/drawing/2014/main" id="{AD3D9CF9-32C5-E4E6-F833-33EC4EB83E9E}"/>
-              </a:ext>
-            </a:extLst>
-          </p:cNvPr>
-          <p:cNvCxnSpPr>
-            <a:cxnSpLocks/>
-          </p:cNvCxnSpPr>
-          <p:nvPr/>
-        </p:nvCxnSpPr>
-        <p:spPr>
-          <a:xfrm>
-            <a:off x="3300546" y="4028661"/>
-            <a:ext cx="108000" cy="0"/>
-          </a:xfrm>
-          <a:prstGeom prst="line">
-            <a:avLst/>
-          </a:prstGeom>
-        </p:spPr>
-        <p:style>
-          <a:lnRef idx="2">
-            <a:schemeClr val="accent1"/>
-          </a:lnRef>
-          <a:fillRef idx="0">
-            <a:schemeClr val="accent1"/>
-          </a:fillRef>
-          <a:effectRef idx="1">
-            <a:schemeClr val="accent1"/>
-          </a:effectRef>
-          <a:fontRef idx="minor">
-            <a:schemeClr val="tx1"/>
-          </a:fontRef>
-        </p:style>
-      </p:cxnSp>
-      <p:cxnSp>
-        <p:nvCxnSpPr>
-          <p:cNvPr id="25" name="Straight Connector 24">
-            <a:extLst>
-              <a:ext uri="{FF2B5EF4-FFF2-40B4-BE49-F238E27FC236}">
-                <a16:creationId xmlns:a16="http://schemas.microsoft.com/office/drawing/2014/main" id="{736A730C-434D-8803-9E96-9846A31B11D0}"/>
-              </a:ext>
-            </a:extLst>
-          </p:cNvPr>
-          <p:cNvCxnSpPr/>
-          <p:nvPr/>
-        </p:nvCxnSpPr>
-        <p:spPr>
-          <a:xfrm>
-            <a:off x="3300546" y="3960795"/>
-            <a:ext cx="0" cy="135732"/>
-          </a:xfrm>
-          <a:prstGeom prst="line">
-            <a:avLst/>
-          </a:prstGeom>
-        </p:spPr>
-        <p:style>
-          <a:lnRef idx="2">
-            <a:schemeClr val="accent1"/>
-          </a:lnRef>
-          <a:fillRef idx="0">
-            <a:schemeClr val="accent1"/>
-          </a:fillRef>
-          <a:effectRef idx="1">
-            <a:schemeClr val="accent1"/>
-          </a:effectRef>
-          <a:fontRef idx="minor">
-            <a:schemeClr val="tx1"/>
-          </a:fontRef>
-        </p:style>
-      </p:cxnSp>
-      <p:cxnSp>
-        <p:nvCxnSpPr>
-          <p:cNvPr id="26" name="Straight Connector 25">
-            <a:extLst>
-              <a:ext uri="{FF2B5EF4-FFF2-40B4-BE49-F238E27FC236}">
-                <a16:creationId xmlns:a16="http://schemas.microsoft.com/office/drawing/2014/main" id="{400B5937-A4FA-C6C2-F665-1DC1E2C73014}"/>
-              </a:ext>
-            </a:extLst>
-          </p:cNvPr>
-          <p:cNvCxnSpPr>
-            <a:cxnSpLocks/>
-          </p:cNvCxnSpPr>
-          <p:nvPr/>
-        </p:nvCxnSpPr>
-        <p:spPr>
-          <a:xfrm>
-            <a:off x="1680545" y="4028661"/>
-            <a:ext cx="108000" cy="0"/>
-          </a:xfrm>
-          <a:prstGeom prst="line">
-            <a:avLst/>
-          </a:prstGeom>
-        </p:spPr>
-        <p:style>
-          <a:lnRef idx="2">
-            <a:schemeClr val="accent1"/>
-          </a:lnRef>
-          <a:fillRef idx="0">
-            <a:schemeClr val="accent1"/>
-          </a:fillRef>
-          <a:effectRef idx="1">
-            <a:schemeClr val="accent1"/>
-          </a:effectRef>
-          <a:fontRef idx="minor">
-            <a:schemeClr val="tx1"/>
-          </a:fontRef>
-        </p:style>
-      </p:cxnSp>
-      <p:cxnSp>
-        <p:nvCxnSpPr>
-          <p:cNvPr id="27" name="Straight Connector 26">
-            <a:extLst>
-              <a:ext uri="{FF2B5EF4-FFF2-40B4-BE49-F238E27FC236}">
-                <a16:creationId xmlns:a16="http://schemas.microsoft.com/office/drawing/2014/main" id="{5F74E0C3-E7D1-0BF3-D1D0-B1A70B0232C3}"/>
-              </a:ext>
-            </a:extLst>
-          </p:cNvPr>
-          <p:cNvCxnSpPr/>
-          <p:nvPr/>
-        </p:nvCxnSpPr>
-        <p:spPr>
-          <a:xfrm>
-            <a:off x="1680545" y="3960795"/>
-            <a:ext cx="0" cy="135732"/>
-          </a:xfrm>
-          <a:prstGeom prst="line">
-            <a:avLst/>
-          </a:prstGeom>
-        </p:spPr>
-        <p:style>
-          <a:lnRef idx="2">
-            <a:schemeClr val="accent1"/>
-          </a:lnRef>
-          <a:fillRef idx="0">
-            <a:schemeClr val="accent1"/>
-          </a:fillRef>
-          <a:effectRef idx="1">
-            <a:schemeClr val="accent1"/>
-          </a:effectRef>
-          <a:fontRef idx="minor">
-            <a:schemeClr val="tx1"/>
-          </a:fontRef>
-        </p:style>
-      </p:cxnSp>
-      <p:cxnSp>
-        <p:nvCxnSpPr>
-          <p:cNvPr id="28" name="Straight Connector 27">
-            <a:extLst>
-              <a:ext uri="{FF2B5EF4-FFF2-40B4-BE49-F238E27FC236}">
-                <a16:creationId xmlns:a16="http://schemas.microsoft.com/office/drawing/2014/main" id="{156756E0-C9F1-7DF4-A872-9F71A54CDC62}"/>
-              </a:ext>
-            </a:extLst>
-          </p:cNvPr>
-          <p:cNvCxnSpPr>
-            <a:cxnSpLocks/>
-          </p:cNvCxnSpPr>
-          <p:nvPr/>
-        </p:nvCxnSpPr>
-        <p:spPr>
-          <a:xfrm>
-            <a:off x="8700546" y="1856050"/>
-            <a:ext cx="108000" cy="0"/>
-          </a:xfrm>
-          <a:prstGeom prst="line">
-            <a:avLst/>
-          </a:prstGeom>
-        </p:spPr>
-        <p:style>
-          <a:lnRef idx="2">
-            <a:schemeClr val="accent1"/>
-          </a:lnRef>
-          <a:fillRef idx="0">
-            <a:schemeClr val="accent1"/>
-          </a:fillRef>
-          <a:effectRef idx="1">
-            <a:schemeClr val="accent1"/>
-          </a:effectRef>
-          <a:fontRef idx="minor">
-            <a:schemeClr val="tx1"/>
-          </a:fontRef>
-        </p:style>
-      </p:cxnSp>
-      <p:cxnSp>
-        <p:nvCxnSpPr>
-          <p:cNvPr id="29" name="Straight Connector 28">
-            <a:extLst>
-              <a:ext uri="{FF2B5EF4-FFF2-40B4-BE49-F238E27FC236}">
-                <a16:creationId xmlns:a16="http://schemas.microsoft.com/office/drawing/2014/main" id="{5256195D-B677-EE6E-F80A-2B19B1D34EC5}"/>
-              </a:ext>
-            </a:extLst>
-          </p:cNvPr>
-          <p:cNvCxnSpPr>
-            <a:cxnSpLocks/>
-          </p:cNvCxnSpPr>
-          <p:nvPr/>
-        </p:nvCxnSpPr>
-        <p:spPr>
-          <a:xfrm>
-            <a:off x="8700546" y="1788184"/>
-            <a:ext cx="0" cy="135732"/>
-          </a:xfrm>
-          <a:prstGeom prst="line">
-            <a:avLst/>
-          </a:prstGeom>
-        </p:spPr>
-        <p:style>
-          <a:lnRef idx="2">
-            <a:schemeClr val="accent1"/>
-          </a:lnRef>
-          <a:fillRef idx="0">
-            <a:schemeClr val="accent1"/>
-          </a:fillRef>
-          <a:effectRef idx="1">
-            <a:schemeClr val="accent1"/>
-          </a:effectRef>
-          <a:fontRef idx="minor">
-            <a:schemeClr val="tx1"/>
-          </a:fontRef>
-        </p:style>
-      </p:cxnSp>
-      <p:cxnSp>
-        <p:nvCxnSpPr>
-          <p:cNvPr id="32" name="Straight Connector 31">
-            <a:extLst>
-              <a:ext uri="{FF2B5EF4-FFF2-40B4-BE49-F238E27FC236}">
-                <a16:creationId xmlns:a16="http://schemas.microsoft.com/office/drawing/2014/main" id="{D5CFDA1B-5FC1-CDE0-B1F4-5D7DBDC1CA22}"/>
-              </a:ext>
-            </a:extLst>
-          </p:cNvPr>
-          <p:cNvCxnSpPr>
-            <a:cxnSpLocks/>
-          </p:cNvCxnSpPr>
-          <p:nvPr/>
-        </p:nvCxnSpPr>
-        <p:spPr>
-          <a:xfrm>
-            <a:off x="7260546" y="1856050"/>
-            <a:ext cx="108000" cy="0"/>
-          </a:xfrm>
-          <a:prstGeom prst="line">
-            <a:avLst/>
-          </a:prstGeom>
-        </p:spPr>
-        <p:style>
-          <a:lnRef idx="2">
-            <a:schemeClr val="accent1"/>
-          </a:lnRef>
-          <a:fillRef idx="0">
-            <a:schemeClr val="accent1"/>
-          </a:fillRef>
-          <a:effectRef idx="1">
-            <a:schemeClr val="accent1"/>
-          </a:effectRef>
-          <a:fontRef idx="minor">
-            <a:schemeClr val="tx1"/>
-          </a:fontRef>
-        </p:style>
-      </p:cxnSp>
-      <p:cxnSp>
-        <p:nvCxnSpPr>
-          <p:cNvPr id="33" name="Straight Connector 32">
-            <a:extLst>
-              <a:ext uri="{FF2B5EF4-FFF2-40B4-BE49-F238E27FC236}">
-                <a16:creationId xmlns:a16="http://schemas.microsoft.com/office/drawing/2014/main" id="{4BDE736A-E5E7-17B1-41F7-6158551EC50C}"/>
-              </a:ext>
-            </a:extLst>
-          </p:cNvPr>
-          <p:cNvCxnSpPr>
-            <a:cxnSpLocks/>
-          </p:cNvCxnSpPr>
-          <p:nvPr/>
-        </p:nvCxnSpPr>
-        <p:spPr>
-          <a:xfrm>
-            <a:off x="7260546" y="1788184"/>
-            <a:ext cx="0" cy="135732"/>
-          </a:xfrm>
-          <a:prstGeom prst="line">
-            <a:avLst/>
-          </a:prstGeom>
-        </p:spPr>
-        <p:style>
-          <a:lnRef idx="2">
-            <a:schemeClr val="accent1"/>
-          </a:lnRef>
-          <a:fillRef idx="0">
-            <a:schemeClr val="accent1"/>
-          </a:fillRef>
-          <a:effectRef idx="1">
-            <a:schemeClr val="accent1"/>
-          </a:effectRef>
-          <a:fontRef idx="minor">
-            <a:schemeClr val="tx1"/>
-          </a:fontRef>
-        </p:style>
-      </p:cxnSp>
-      <p:cxnSp>
-        <p:nvCxnSpPr>
-          <p:cNvPr id="34" name="Straight Connector 33">
-            <a:extLst>
-              <a:ext uri="{FF2B5EF4-FFF2-40B4-BE49-F238E27FC236}">
-                <a16:creationId xmlns:a16="http://schemas.microsoft.com/office/drawing/2014/main" id="{D22BF6C5-23E7-FC21-C2E7-1F39F8723B3B}"/>
-              </a:ext>
-            </a:extLst>
-          </p:cNvPr>
-          <p:cNvCxnSpPr>
-            <a:cxnSpLocks/>
-          </p:cNvCxnSpPr>
-          <p:nvPr/>
-        </p:nvCxnSpPr>
-        <p:spPr>
-          <a:xfrm>
-            <a:off x="5820546" y="1856050"/>
-            <a:ext cx="108000" cy="0"/>
-          </a:xfrm>
-          <a:prstGeom prst="line">
-            <a:avLst/>
-          </a:prstGeom>
-        </p:spPr>
-        <p:style>
-          <a:lnRef idx="2">
-            <a:schemeClr val="accent1"/>
-          </a:lnRef>
-          <a:fillRef idx="0">
-            <a:schemeClr val="accent1"/>
-          </a:fillRef>
-          <a:effectRef idx="1">
-            <a:schemeClr val="accent1"/>
-          </a:effectRef>
-          <a:fontRef idx="minor">
-            <a:schemeClr val="tx1"/>
-          </a:fontRef>
-        </p:style>
-      </p:cxnSp>
-      <p:cxnSp>
-        <p:nvCxnSpPr>
-          <p:cNvPr id="35" name="Straight Connector 34">
-            <a:extLst>
-              <a:ext uri="{FF2B5EF4-FFF2-40B4-BE49-F238E27FC236}">
-                <a16:creationId xmlns:a16="http://schemas.microsoft.com/office/drawing/2014/main" id="{F747FBBB-AC89-AA31-13FD-C8517433ED92}"/>
-              </a:ext>
-            </a:extLst>
-          </p:cNvPr>
-          <p:cNvCxnSpPr>
-            <a:cxnSpLocks/>
-          </p:cNvCxnSpPr>
-          <p:nvPr/>
-        </p:nvCxnSpPr>
-        <p:spPr>
-          <a:xfrm>
-            <a:off x="5820546" y="1788184"/>
-            <a:ext cx="0" cy="135732"/>
-          </a:xfrm>
-          <a:prstGeom prst="line">
-            <a:avLst/>
-          </a:prstGeom>
-        </p:spPr>
-        <p:style>
-          <a:lnRef idx="2">
-            <a:schemeClr val="accent1"/>
-          </a:lnRef>
-          <a:fillRef idx="0">
-            <a:schemeClr val="accent1"/>
-          </a:fillRef>
-          <a:effectRef idx="1">
-            <a:schemeClr val="accent1"/>
-          </a:effectRef>
-          <a:fontRef idx="minor">
-            <a:schemeClr val="tx1"/>
-          </a:fontRef>
-        </p:style>
-      </p:cxnSp>
-      <p:cxnSp>
-        <p:nvCxnSpPr>
-          <p:cNvPr id="36" name="Straight Connector 35">
-            <a:extLst>
-              <a:ext uri="{FF2B5EF4-FFF2-40B4-BE49-F238E27FC236}">
-                <a16:creationId xmlns:a16="http://schemas.microsoft.com/office/drawing/2014/main" id="{8726B9EB-FF61-520B-610B-438B5E61A198}"/>
-              </a:ext>
-            </a:extLst>
-          </p:cNvPr>
-          <p:cNvCxnSpPr>
-            <a:cxnSpLocks/>
-          </p:cNvCxnSpPr>
-          <p:nvPr/>
-        </p:nvCxnSpPr>
-        <p:spPr>
-          <a:xfrm>
-            <a:off x="4380546" y="1856050"/>
-            <a:ext cx="108000" cy="0"/>
-          </a:xfrm>
-          <a:prstGeom prst="line">
-            <a:avLst/>
-          </a:prstGeom>
-        </p:spPr>
-        <p:style>
-          <a:lnRef idx="2">
-            <a:schemeClr val="accent1"/>
-          </a:lnRef>
-          <a:fillRef idx="0">
-            <a:schemeClr val="accent1"/>
-          </a:fillRef>
-          <a:effectRef idx="1">
-            <a:schemeClr val="accent1"/>
-          </a:effectRef>
-          <a:fontRef idx="minor">
-            <a:schemeClr val="tx1"/>
-          </a:fontRef>
-        </p:style>
-      </p:cxnSp>
-      <p:cxnSp>
-        <p:nvCxnSpPr>
-          <p:cNvPr id="37" name="Straight Connector 36">
-            <a:extLst>
-              <a:ext uri="{FF2B5EF4-FFF2-40B4-BE49-F238E27FC236}">
-                <a16:creationId xmlns:a16="http://schemas.microsoft.com/office/drawing/2014/main" id="{0D4ABB0A-124A-D013-C8A9-4C33559D5039}"/>
-              </a:ext>
-            </a:extLst>
-          </p:cNvPr>
-          <p:cNvCxnSpPr>
-            <a:cxnSpLocks/>
-          </p:cNvCxnSpPr>
-          <p:nvPr/>
-        </p:nvCxnSpPr>
-        <p:spPr>
-          <a:xfrm>
-            <a:off x="4380546" y="1788184"/>
-            <a:ext cx="0" cy="135732"/>
-          </a:xfrm>
-          <a:prstGeom prst="line">
-            <a:avLst/>
-          </a:prstGeom>
-        </p:spPr>
-        <p:style>
-          <a:lnRef idx="2">
-            <a:schemeClr val="accent1"/>
-          </a:lnRef>
-          <a:fillRef idx="0">
-            <a:schemeClr val="accent1"/>
-          </a:fillRef>
-          <a:effectRef idx="1">
-            <a:schemeClr val="accent1"/>
-          </a:effectRef>
-          <a:fontRef idx="minor">
-            <a:schemeClr val="tx1"/>
-          </a:fontRef>
-        </p:style>
-      </p:cxnSp>
-      <p:cxnSp>
-        <p:nvCxnSpPr>
-          <p:cNvPr id="38" name="Straight Connector 37">
-            <a:extLst>
-              <a:ext uri="{FF2B5EF4-FFF2-40B4-BE49-F238E27FC236}">
-                <a16:creationId xmlns:a16="http://schemas.microsoft.com/office/drawing/2014/main" id="{C4747417-C8AA-3D1D-081B-3FC499E65603}"/>
-              </a:ext>
-            </a:extLst>
-          </p:cNvPr>
-          <p:cNvCxnSpPr>
-            <a:cxnSpLocks/>
-          </p:cNvCxnSpPr>
-          <p:nvPr/>
-        </p:nvCxnSpPr>
-        <p:spPr>
-          <a:xfrm>
-            <a:off x="2940546" y="1856050"/>
-            <a:ext cx="108000" cy="0"/>
-          </a:xfrm>
-          <a:prstGeom prst="line">
-            <a:avLst/>
-          </a:prstGeom>
-        </p:spPr>
-        <p:style>
-          <a:lnRef idx="2">
-            <a:schemeClr val="accent1"/>
-          </a:lnRef>
-          <a:fillRef idx="0">
-            <a:schemeClr val="accent1"/>
-          </a:fillRef>
-          <a:effectRef idx="1">
-            <a:schemeClr val="accent1"/>
-          </a:effectRef>
-          <a:fontRef idx="minor">
-            <a:schemeClr val="tx1"/>
-          </a:fontRef>
-        </p:style>
-      </p:cxnSp>
-      <p:cxnSp>
-        <p:nvCxnSpPr>
-          <p:cNvPr id="39" name="Straight Connector 38">
-            <a:extLst>
-              <a:ext uri="{FF2B5EF4-FFF2-40B4-BE49-F238E27FC236}">
-                <a16:creationId xmlns:a16="http://schemas.microsoft.com/office/drawing/2014/main" id="{7264E063-BFCA-D65D-3F8F-34E71322FA5F}"/>
-              </a:ext>
-            </a:extLst>
-          </p:cNvPr>
-          <p:cNvCxnSpPr>
-            <a:cxnSpLocks/>
-          </p:cNvCxnSpPr>
-          <p:nvPr/>
-        </p:nvCxnSpPr>
-        <p:spPr>
-          <a:xfrm>
-            <a:off x="2940546" y="1788184"/>
-            <a:ext cx="0" cy="135732"/>
-          </a:xfrm>
-          <a:prstGeom prst="line">
-            <a:avLst/>
-          </a:prstGeom>
-        </p:spPr>
-        <p:style>
-          <a:lnRef idx="2">
-            <a:schemeClr val="accent1"/>
-          </a:lnRef>
-          <a:fillRef idx="0">
-            <a:schemeClr val="accent1"/>
-          </a:fillRef>
-          <a:effectRef idx="1">
-            <a:schemeClr val="accent1"/>
-          </a:effectRef>
-          <a:fontRef idx="minor">
-            <a:schemeClr val="tx1"/>
-          </a:fontRef>
-        </p:style>
-      </p:cxnSp>
-      <p:cxnSp>
-        <p:nvCxnSpPr>
-          <p:cNvPr id="40" name="Straight Connector 39">
-            <a:extLst>
-              <a:ext uri="{FF2B5EF4-FFF2-40B4-BE49-F238E27FC236}">
-                <a16:creationId xmlns:a16="http://schemas.microsoft.com/office/drawing/2014/main" id="{389A41AF-AB1E-D0C1-6B10-C72579AA8905}"/>
-              </a:ext>
-            </a:extLst>
-          </p:cNvPr>
-          <p:cNvCxnSpPr>
-            <a:cxnSpLocks/>
-          </p:cNvCxnSpPr>
-          <p:nvPr/>
-        </p:nvCxnSpPr>
-        <p:spPr>
-          <a:xfrm>
-            <a:off x="1500546" y="1856050"/>
-            <a:ext cx="108000" cy="0"/>
-          </a:xfrm>
-          <a:prstGeom prst="line">
-            <a:avLst/>
-          </a:prstGeom>
-        </p:spPr>
-        <p:style>
-          <a:lnRef idx="2">
-            <a:schemeClr val="accent1"/>
-          </a:lnRef>
-          <a:fillRef idx="0">
-            <a:schemeClr val="accent1"/>
-          </a:fillRef>
-          <a:effectRef idx="1">
-            <a:schemeClr val="accent1"/>
-          </a:effectRef>
-          <a:fontRef idx="minor">
-            <a:schemeClr val="tx1"/>
-          </a:fontRef>
-        </p:style>
-      </p:cxnSp>
-      <p:cxnSp>
-        <p:nvCxnSpPr>
-          <p:cNvPr id="41" name="Straight Connector 40">
-            <a:extLst>
-              <a:ext uri="{FF2B5EF4-FFF2-40B4-BE49-F238E27FC236}">
-                <a16:creationId xmlns:a16="http://schemas.microsoft.com/office/drawing/2014/main" id="{3F4783D3-CC71-7B3E-72B8-4C89E81D2D9B}"/>
-              </a:ext>
-            </a:extLst>
-          </p:cNvPr>
-          <p:cNvCxnSpPr>
-            <a:cxnSpLocks/>
-          </p:cNvCxnSpPr>
-          <p:nvPr/>
-        </p:nvCxnSpPr>
-        <p:spPr>
-          <a:xfrm>
-            <a:off x="1500546" y="1788184"/>
-            <a:ext cx="0" cy="135732"/>
-          </a:xfrm>
-          <a:prstGeom prst="line">
-            <a:avLst/>
-          </a:prstGeom>
-        </p:spPr>
-        <p:style>
-          <a:lnRef idx="2">
-            <a:schemeClr val="accent1"/>
-          </a:lnRef>
-          <a:fillRef idx="0">
-            <a:schemeClr val="accent1"/>
-          </a:fillRef>
-          <a:effectRef idx="1">
-            <a:schemeClr val="accent1"/>
-          </a:effectRef>
-          <a:fontRef idx="minor">
-            <a:schemeClr val="tx1"/>
-          </a:fontRef>
-        </p:style>
-      </p:cxnSp>
-      <p:cxnSp>
-        <p:nvCxnSpPr>
-          <p:cNvPr id="54" name="Straight Connector 53">
-            <a:extLst>
-              <a:ext uri="{FF2B5EF4-FFF2-40B4-BE49-F238E27FC236}">
-                <a16:creationId xmlns:a16="http://schemas.microsoft.com/office/drawing/2014/main" id="{D4BEF8C7-291D-F487-BF00-385D9CC482D2}"/>
-              </a:ext>
-            </a:extLst>
-          </p:cNvPr>
-          <p:cNvCxnSpPr>
-            <a:cxnSpLocks/>
-          </p:cNvCxnSpPr>
-          <p:nvPr/>
-        </p:nvCxnSpPr>
-        <p:spPr>
-          <a:xfrm>
-            <a:off x="7980546" y="6196292"/>
-            <a:ext cx="108000" cy="0"/>
-          </a:xfrm>
-          <a:prstGeom prst="line">
-            <a:avLst/>
-          </a:prstGeom>
-        </p:spPr>
-        <p:style>
-          <a:lnRef idx="2">
-            <a:schemeClr val="accent1"/>
-          </a:lnRef>
-          <a:fillRef idx="0">
-            <a:schemeClr val="accent1"/>
-          </a:fillRef>
-          <a:effectRef idx="1">
-            <a:schemeClr val="accent1"/>
-          </a:effectRef>
-          <a:fontRef idx="minor">
-            <a:schemeClr val="tx1"/>
-          </a:fontRef>
-        </p:style>
-      </p:cxnSp>
-      <p:cxnSp>
-        <p:nvCxnSpPr>
-          <p:cNvPr id="70" name="Straight Connector 69">
-            <a:extLst>
-              <a:ext uri="{FF2B5EF4-FFF2-40B4-BE49-F238E27FC236}">
-                <a16:creationId xmlns:a16="http://schemas.microsoft.com/office/drawing/2014/main" id="{11EB7F70-4479-8AEF-FD5B-788CED1A6689}"/>
-              </a:ext>
-            </a:extLst>
-          </p:cNvPr>
-          <p:cNvCxnSpPr/>
-          <p:nvPr/>
-        </p:nvCxnSpPr>
-        <p:spPr>
-          <a:xfrm>
-            <a:off x="7980546" y="6128426"/>
-            <a:ext cx="0" cy="135732"/>
-          </a:xfrm>
-          <a:prstGeom prst="line">
-            <a:avLst/>
-          </a:prstGeom>
-        </p:spPr>
-        <p:style>
-          <a:lnRef idx="2">
-            <a:schemeClr val="accent1"/>
-          </a:lnRef>
-          <a:fillRef idx="0">
-            <a:schemeClr val="accent1"/>
-          </a:fillRef>
-          <a:effectRef idx="1">
-            <a:schemeClr val="accent1"/>
-          </a:effectRef>
-          <a:fontRef idx="minor">
-            <a:schemeClr val="tx1"/>
-          </a:fontRef>
-        </p:style>
-      </p:cxnSp>
-      <p:cxnSp>
-        <p:nvCxnSpPr>
-          <p:cNvPr id="71" name="Straight Connector 70">
-            <a:extLst>
-              <a:ext uri="{FF2B5EF4-FFF2-40B4-BE49-F238E27FC236}">
-                <a16:creationId xmlns:a16="http://schemas.microsoft.com/office/drawing/2014/main" id="{2FECC16D-BFBA-917D-A6E3-7A2804863C6C}"/>
-              </a:ext>
-            </a:extLst>
-          </p:cNvPr>
-          <p:cNvCxnSpPr>
-            <a:cxnSpLocks/>
-          </p:cNvCxnSpPr>
-          <p:nvPr/>
-        </p:nvCxnSpPr>
-        <p:spPr>
-          <a:xfrm>
-            <a:off x="6000546" y="6196292"/>
-            <a:ext cx="108000" cy="0"/>
-          </a:xfrm>
-          <a:prstGeom prst="line">
-            <a:avLst/>
-          </a:prstGeom>
-        </p:spPr>
-        <p:style>
-          <a:lnRef idx="2">
-            <a:schemeClr val="accent1"/>
-          </a:lnRef>
-          <a:fillRef idx="0">
-            <a:schemeClr val="accent1"/>
-          </a:fillRef>
-          <a:effectRef idx="1">
-            <a:schemeClr val="accent1"/>
-          </a:effectRef>
-          <a:fontRef idx="minor">
-            <a:schemeClr val="tx1"/>
-          </a:fontRef>
-        </p:style>
-      </p:cxnSp>
-      <p:cxnSp>
-        <p:nvCxnSpPr>
-          <p:cNvPr id="72" name="Straight Connector 71">
-            <a:extLst>
-              <a:ext uri="{FF2B5EF4-FFF2-40B4-BE49-F238E27FC236}">
-                <a16:creationId xmlns:a16="http://schemas.microsoft.com/office/drawing/2014/main" id="{CE88511C-1039-D008-3587-5F29132DB162}"/>
-              </a:ext>
-            </a:extLst>
-          </p:cNvPr>
-          <p:cNvCxnSpPr/>
-          <p:nvPr/>
-        </p:nvCxnSpPr>
-        <p:spPr>
-          <a:xfrm>
-            <a:off x="6000546" y="6128426"/>
-            <a:ext cx="0" cy="135732"/>
-          </a:xfrm>
-          <a:prstGeom prst="line">
-            <a:avLst/>
-          </a:prstGeom>
-        </p:spPr>
-        <p:style>
-          <a:lnRef idx="2">
-            <a:schemeClr val="accent1"/>
-          </a:lnRef>
-          <a:fillRef idx="0">
-            <a:schemeClr val="accent1"/>
-          </a:fillRef>
-          <a:effectRef idx="1">
-            <a:schemeClr val="accent1"/>
-          </a:effectRef>
-          <a:fontRef idx="minor">
-            <a:schemeClr val="tx1"/>
-          </a:fontRef>
-        </p:style>
-      </p:cxnSp>
-      <p:cxnSp>
-        <p:nvCxnSpPr>
-          <p:cNvPr id="73" name="Straight Connector 72">
-            <a:extLst>
-              <a:ext uri="{FF2B5EF4-FFF2-40B4-BE49-F238E27FC236}">
-                <a16:creationId xmlns:a16="http://schemas.microsoft.com/office/drawing/2014/main" id="{8AAAAEDA-DEBB-BEE8-DCB6-C712783ED58C}"/>
-              </a:ext>
-            </a:extLst>
-          </p:cNvPr>
-          <p:cNvCxnSpPr>
-            <a:cxnSpLocks/>
-          </p:cNvCxnSpPr>
-          <p:nvPr/>
-        </p:nvCxnSpPr>
-        <p:spPr>
-          <a:xfrm>
-            <a:off x="4020546" y="6196292"/>
-            <a:ext cx="108000" cy="0"/>
-          </a:xfrm>
-          <a:prstGeom prst="line">
-            <a:avLst/>
-          </a:prstGeom>
-        </p:spPr>
-        <p:style>
-          <a:lnRef idx="2">
-            <a:schemeClr val="accent1"/>
-          </a:lnRef>
-          <a:fillRef idx="0">
-            <a:schemeClr val="accent1"/>
-          </a:fillRef>
-          <a:effectRef idx="1">
-            <a:schemeClr val="accent1"/>
-          </a:effectRef>
-          <a:fontRef idx="minor">
-            <a:schemeClr val="tx1"/>
-          </a:fontRef>
-        </p:style>
-      </p:cxnSp>
-      <p:cxnSp>
-        <p:nvCxnSpPr>
-          <p:cNvPr id="74" name="Straight Connector 73">
-            <a:extLst>
-              <a:ext uri="{FF2B5EF4-FFF2-40B4-BE49-F238E27FC236}">
-                <a16:creationId xmlns:a16="http://schemas.microsoft.com/office/drawing/2014/main" id="{E24B745B-3EE9-8E5D-5982-221708B5D582}"/>
-              </a:ext>
-            </a:extLst>
-          </p:cNvPr>
-          <p:cNvCxnSpPr/>
-          <p:nvPr/>
-        </p:nvCxnSpPr>
-        <p:spPr>
-          <a:xfrm>
-            <a:off x="4020546" y="6128426"/>
-            <a:ext cx="0" cy="135732"/>
-          </a:xfrm>
-          <a:prstGeom prst="line">
-            <a:avLst/>
-          </a:prstGeom>
-        </p:spPr>
-        <p:style>
-          <a:lnRef idx="2">
-            <a:schemeClr val="accent1"/>
-          </a:lnRef>
-          <a:fillRef idx="0">
-            <a:schemeClr val="accent1"/>
-          </a:fillRef>
-          <a:effectRef idx="1">
-            <a:schemeClr val="accent1"/>
-          </a:effectRef>
-          <a:fontRef idx="minor">
-            <a:schemeClr val="tx1"/>
-          </a:fontRef>
-        </p:style>
-      </p:cxnSp>
-      <p:cxnSp>
-        <p:nvCxnSpPr>
-          <p:cNvPr id="75" name="Straight Connector 74">
-            <a:extLst>
-              <a:ext uri="{FF2B5EF4-FFF2-40B4-BE49-F238E27FC236}">
-                <a16:creationId xmlns:a16="http://schemas.microsoft.com/office/drawing/2014/main" id="{35CF3D33-169F-F367-ADA8-5D4FD1C87FDB}"/>
-              </a:ext>
-            </a:extLst>
-          </p:cNvPr>
-          <p:cNvCxnSpPr>
-            <a:cxnSpLocks/>
-          </p:cNvCxnSpPr>
-          <p:nvPr/>
-        </p:nvCxnSpPr>
-        <p:spPr>
-          <a:xfrm>
-            <a:off x="2040546" y="6196292"/>
-            <a:ext cx="108000" cy="0"/>
-          </a:xfrm>
-          <a:prstGeom prst="line">
-            <a:avLst/>
-          </a:prstGeom>
-        </p:spPr>
-        <p:style>
-          <a:lnRef idx="2">
-            <a:schemeClr val="accent1"/>
-          </a:lnRef>
-          <a:fillRef idx="0">
-            <a:schemeClr val="accent1"/>
-          </a:fillRef>
-          <a:effectRef idx="1">
-            <a:schemeClr val="accent1"/>
-          </a:effectRef>
-          <a:fontRef idx="minor">
-            <a:schemeClr val="tx1"/>
-          </a:fontRef>
-        </p:style>
-      </p:cxnSp>
-      <p:cxnSp>
-        <p:nvCxnSpPr>
-          <p:cNvPr id="76" name="Straight Connector 75">
-            <a:extLst>
-              <a:ext uri="{FF2B5EF4-FFF2-40B4-BE49-F238E27FC236}">
-                <a16:creationId xmlns:a16="http://schemas.microsoft.com/office/drawing/2014/main" id="{295762A6-B3A8-9C37-6AA4-10E4CB6C3209}"/>
-              </a:ext>
-            </a:extLst>
-          </p:cNvPr>
-          <p:cNvCxnSpPr/>
-          <p:nvPr/>
-        </p:nvCxnSpPr>
-        <p:spPr>
-          <a:xfrm>
-            <a:off x="2040546" y="6128426"/>
-            <a:ext cx="0" cy="135732"/>
-          </a:xfrm>
-          <a:prstGeom prst="line">
-            <a:avLst/>
-          </a:prstGeom>
-        </p:spPr>
-        <p:style>
-          <a:lnRef idx="2">
-            <a:schemeClr val="accent1"/>
-          </a:lnRef>
-          <a:fillRef idx="0">
-            <a:schemeClr val="accent1"/>
-          </a:fillRef>
-          <a:effectRef idx="1">
-            <a:schemeClr val="accent1"/>
-          </a:effectRef>
-          <a:fontRef idx="minor">
-            <a:schemeClr val="tx1"/>
-          </a:fontRef>
-        </p:style>
-      </p:cxnSp>
-      <p:cxnSp>
-        <p:nvCxnSpPr>
-          <p:cNvPr id="82" name="Straight Connector 81">
-            <a:extLst>
-              <a:ext uri="{FF2B5EF4-FFF2-40B4-BE49-F238E27FC236}">
-                <a16:creationId xmlns:a16="http://schemas.microsoft.com/office/drawing/2014/main" id="{81D1012D-F1AD-32EC-579A-AC2E05B4BF9A}"/>
-              </a:ext>
-            </a:extLst>
-          </p:cNvPr>
-          <p:cNvCxnSpPr/>
-          <p:nvPr/>
-        </p:nvCxnSpPr>
-        <p:spPr>
-          <a:xfrm>
-            <a:off x="5928546" y="629560"/>
+            <a:off x="6647858" y="2821874"/>
             <a:ext cx="3240000" cy="0"/>
           </a:xfrm>
           <a:prstGeom prst="line">
@@ -15943,10 +14934,130 @@
       </p:cxnSp>
       <p:cxnSp>
         <p:nvCxnSpPr>
-          <p:cNvPr id="83" name="Straight Arrow Connector 82">
-            <a:extLst>
-              <a:ext uri="{FF2B5EF4-FFF2-40B4-BE49-F238E27FC236}">
-                <a16:creationId xmlns:a16="http://schemas.microsoft.com/office/drawing/2014/main" id="{E6C0D113-80D3-C320-12A4-3CC76B8377BA}"/>
+          <p:cNvPr id="6" name="Straight Connector 5">
+            <a:extLst>
+              <a:ext uri="{FF2B5EF4-FFF2-40B4-BE49-F238E27FC236}">
+                <a16:creationId xmlns:a16="http://schemas.microsoft.com/office/drawing/2014/main" id="{1A415586-87EF-8321-21FA-9204ADDCE6D6}"/>
+              </a:ext>
+            </a:extLst>
+          </p:cNvPr>
+          <p:cNvCxnSpPr/>
+          <p:nvPr/>
+        </p:nvCxnSpPr>
+        <p:spPr>
+          <a:xfrm>
+            <a:off x="168546" y="4028661"/>
+            <a:ext cx="1620000" cy="0"/>
+          </a:xfrm>
+          <a:prstGeom prst="line">
+            <a:avLst/>
+          </a:prstGeom>
+          <a:ln>
+            <a:headEnd type="oval" w="med" len="med"/>
+            <a:tailEnd type="oval" w="med" len="med"/>
+          </a:ln>
+        </p:spPr>
+        <p:style>
+          <a:lnRef idx="2">
+            <a:schemeClr val="accent6"/>
+          </a:lnRef>
+          <a:fillRef idx="0">
+            <a:schemeClr val="accent6"/>
+          </a:fillRef>
+          <a:effectRef idx="1">
+            <a:schemeClr val="accent6"/>
+          </a:effectRef>
+          <a:fontRef idx="minor">
+            <a:schemeClr val="tx1"/>
+          </a:fontRef>
+        </p:style>
+      </p:cxnSp>
+      <p:cxnSp>
+        <p:nvCxnSpPr>
+          <p:cNvPr id="7" name="Straight Connector 6">
+            <a:extLst>
+              <a:ext uri="{FF2B5EF4-FFF2-40B4-BE49-F238E27FC236}">
+                <a16:creationId xmlns:a16="http://schemas.microsoft.com/office/drawing/2014/main" id="{5A831BF8-A739-A8C3-4240-A016C81665B6}"/>
+              </a:ext>
+            </a:extLst>
+          </p:cNvPr>
+          <p:cNvCxnSpPr/>
+          <p:nvPr/>
+        </p:nvCxnSpPr>
+        <p:spPr>
+          <a:xfrm>
+            <a:off x="1788546" y="4028661"/>
+            <a:ext cx="1620000" cy="0"/>
+          </a:xfrm>
+          <a:prstGeom prst="line">
+            <a:avLst/>
+          </a:prstGeom>
+          <a:ln>
+            <a:headEnd type="oval" w="med" len="med"/>
+            <a:tailEnd type="oval" w="med" len="med"/>
+          </a:ln>
+        </p:spPr>
+        <p:style>
+          <a:lnRef idx="2">
+            <a:schemeClr val="accent6"/>
+          </a:lnRef>
+          <a:fillRef idx="0">
+            <a:schemeClr val="accent6"/>
+          </a:fillRef>
+          <a:effectRef idx="1">
+            <a:schemeClr val="accent6"/>
+          </a:effectRef>
+          <a:fontRef idx="minor">
+            <a:schemeClr val="tx1"/>
+          </a:fontRef>
+        </p:style>
+      </p:cxnSp>
+      <p:cxnSp>
+        <p:nvCxnSpPr>
+          <p:cNvPr id="8" name="Straight Connector 7">
+            <a:extLst>
+              <a:ext uri="{FF2B5EF4-FFF2-40B4-BE49-F238E27FC236}">
+                <a16:creationId xmlns:a16="http://schemas.microsoft.com/office/drawing/2014/main" id="{7A7B4F02-FF2B-9522-D9A7-0AC01530B359}"/>
+              </a:ext>
+            </a:extLst>
+          </p:cNvPr>
+          <p:cNvCxnSpPr/>
+          <p:nvPr/>
+        </p:nvCxnSpPr>
+        <p:spPr>
+          <a:xfrm>
+            <a:off x="3408546" y="4028661"/>
+            <a:ext cx="1620000" cy="0"/>
+          </a:xfrm>
+          <a:prstGeom prst="line">
+            <a:avLst/>
+          </a:prstGeom>
+          <a:ln>
+            <a:headEnd type="oval" w="med" len="med"/>
+            <a:tailEnd type="oval" w="med" len="med"/>
+          </a:ln>
+        </p:spPr>
+        <p:style>
+          <a:lnRef idx="2">
+            <a:schemeClr val="accent6"/>
+          </a:lnRef>
+          <a:fillRef idx="0">
+            <a:schemeClr val="accent6"/>
+          </a:fillRef>
+          <a:effectRef idx="1">
+            <a:schemeClr val="accent6"/>
+          </a:effectRef>
+          <a:fontRef idx="minor">
+            <a:schemeClr val="tx1"/>
+          </a:fontRef>
+        </p:style>
+      </p:cxnSp>
+      <p:cxnSp>
+        <p:nvCxnSpPr>
+          <p:cNvPr id="10" name="Straight Arrow Connector 9">
+            <a:extLst>
+              <a:ext uri="{FF2B5EF4-FFF2-40B4-BE49-F238E27FC236}">
+                <a16:creationId xmlns:a16="http://schemas.microsoft.com/office/drawing/2014/main" id="{CFEF041D-35E6-D97D-E85E-7A1D5B8AF5AA}"/>
               </a:ext>
             </a:extLst>
           </p:cNvPr>
@@ -15957,7 +15068,7 @@
         </p:nvCxnSpPr>
         <p:spPr>
           <a:xfrm>
-            <a:off x="5928546" y="782954"/>
+            <a:off x="6647858" y="2975268"/>
             <a:ext cx="0" cy="900000"/>
           </a:xfrm>
           <a:prstGeom prst="straightConnector1">
@@ -15984,10 +15095,10 @@
       </p:cxnSp>
       <p:sp>
         <p:nvSpPr>
-          <p:cNvPr id="84" name="TextBox 83">
-            <a:extLst>
-              <a:ext uri="{FF2B5EF4-FFF2-40B4-BE49-F238E27FC236}">
-                <a16:creationId xmlns:a16="http://schemas.microsoft.com/office/drawing/2014/main" id="{DA571669-C8DC-A7E8-BE01-B10A340439E3}"/>
+          <p:cNvPr id="13" name="TextBox 12">
+            <a:extLst>
+              <a:ext uri="{FF2B5EF4-FFF2-40B4-BE49-F238E27FC236}">
+                <a16:creationId xmlns:a16="http://schemas.microsoft.com/office/drawing/2014/main" id="{88043019-79F9-ED80-FA7A-6AB82EA3582A}"/>
               </a:ext>
             </a:extLst>
           </p:cNvPr>
@@ -15996,7 +15107,7 @@
         </p:nvSpPr>
         <p:spPr>
           <a:xfrm>
-            <a:off x="5653470" y="106835"/>
+            <a:off x="6372782" y="2299149"/>
             <a:ext cx="550151" cy="369332"/>
           </a:xfrm>
           <a:prstGeom prst="rect">
@@ -16019,10 +15130,10 @@
       </p:sp>
       <p:sp>
         <p:nvSpPr>
-          <p:cNvPr id="85" name="TextBox 84">
-            <a:extLst>
-              <a:ext uri="{FF2B5EF4-FFF2-40B4-BE49-F238E27FC236}">
-                <a16:creationId xmlns:a16="http://schemas.microsoft.com/office/drawing/2014/main" id="{881493E6-62CA-20DA-F650-5B738BE981C4}"/>
+          <p:cNvPr id="43" name="TextBox 42">
+            <a:extLst>
+              <a:ext uri="{FF2B5EF4-FFF2-40B4-BE49-F238E27FC236}">
+                <a16:creationId xmlns:a16="http://schemas.microsoft.com/office/drawing/2014/main" id="{F83C574B-BC02-3BD6-2F73-0D75835433BE}"/>
               </a:ext>
             </a:extLst>
           </p:cNvPr>
@@ -16031,7 +15142,7 @@
         </p:nvSpPr>
         <p:spPr>
           <a:xfrm>
-            <a:off x="8898546" y="106835"/>
+            <a:off x="9617858" y="2299149"/>
             <a:ext cx="556563" cy="369332"/>
           </a:xfrm>
           <a:prstGeom prst="rect">
@@ -16055,10 +15166,130 @@
       </p:sp>
       <p:cxnSp>
         <p:nvCxnSpPr>
-          <p:cNvPr id="86" name="Straight Arrow Connector 85">
-            <a:extLst>
-              <a:ext uri="{FF2B5EF4-FFF2-40B4-BE49-F238E27FC236}">
-                <a16:creationId xmlns:a16="http://schemas.microsoft.com/office/drawing/2014/main" id="{5B07FBF4-096C-1A17-6431-87133D24AA5F}"/>
+          <p:cNvPr id="44" name="Straight Connector 43">
+            <a:extLst>
+              <a:ext uri="{FF2B5EF4-FFF2-40B4-BE49-F238E27FC236}">
+                <a16:creationId xmlns:a16="http://schemas.microsoft.com/office/drawing/2014/main" id="{9C305E6C-86E7-D91B-2EBA-CD3B3AE4395D}"/>
+              </a:ext>
+            </a:extLst>
+          </p:cNvPr>
+          <p:cNvCxnSpPr/>
+          <p:nvPr/>
+        </p:nvCxnSpPr>
+        <p:spPr>
+          <a:xfrm>
+            <a:off x="5028546" y="4028661"/>
+            <a:ext cx="1620000" cy="0"/>
+          </a:xfrm>
+          <a:prstGeom prst="line">
+            <a:avLst/>
+          </a:prstGeom>
+          <a:ln>
+            <a:headEnd type="oval" w="med" len="med"/>
+            <a:tailEnd type="oval" w="med" len="med"/>
+          </a:ln>
+        </p:spPr>
+        <p:style>
+          <a:lnRef idx="2">
+            <a:schemeClr val="accent6"/>
+          </a:lnRef>
+          <a:fillRef idx="0">
+            <a:schemeClr val="accent6"/>
+          </a:fillRef>
+          <a:effectRef idx="1">
+            <a:schemeClr val="accent6"/>
+          </a:effectRef>
+          <a:fontRef idx="minor">
+            <a:schemeClr val="tx1"/>
+          </a:fontRef>
+        </p:style>
+      </p:cxnSp>
+      <p:cxnSp>
+        <p:nvCxnSpPr>
+          <p:cNvPr id="45" name="Straight Connector 44">
+            <a:extLst>
+              <a:ext uri="{FF2B5EF4-FFF2-40B4-BE49-F238E27FC236}">
+                <a16:creationId xmlns:a16="http://schemas.microsoft.com/office/drawing/2014/main" id="{52F88653-B63C-4F3F-6730-3E19C3570B7C}"/>
+              </a:ext>
+            </a:extLst>
+          </p:cNvPr>
+          <p:cNvCxnSpPr/>
+          <p:nvPr/>
+        </p:nvCxnSpPr>
+        <p:spPr>
+          <a:xfrm>
+            <a:off x="6647859" y="4028661"/>
+            <a:ext cx="1620000" cy="0"/>
+          </a:xfrm>
+          <a:prstGeom prst="line">
+            <a:avLst/>
+          </a:prstGeom>
+          <a:ln>
+            <a:headEnd type="oval" w="med" len="med"/>
+            <a:tailEnd type="oval" w="med" len="med"/>
+          </a:ln>
+        </p:spPr>
+        <p:style>
+          <a:lnRef idx="2">
+            <a:schemeClr val="accent6"/>
+          </a:lnRef>
+          <a:fillRef idx="0">
+            <a:schemeClr val="accent6"/>
+          </a:fillRef>
+          <a:effectRef idx="1">
+            <a:schemeClr val="accent6"/>
+          </a:effectRef>
+          <a:fontRef idx="minor">
+            <a:schemeClr val="tx1"/>
+          </a:fontRef>
+        </p:style>
+      </p:cxnSp>
+      <p:cxnSp>
+        <p:nvCxnSpPr>
+          <p:cNvPr id="46" name="Straight Connector 45">
+            <a:extLst>
+              <a:ext uri="{FF2B5EF4-FFF2-40B4-BE49-F238E27FC236}">
+                <a16:creationId xmlns:a16="http://schemas.microsoft.com/office/drawing/2014/main" id="{5001F4C6-97A5-0971-1971-8131A5FB892E}"/>
+              </a:ext>
+            </a:extLst>
+          </p:cNvPr>
+          <p:cNvCxnSpPr/>
+          <p:nvPr/>
+        </p:nvCxnSpPr>
+        <p:spPr>
+          <a:xfrm>
+            <a:off x="8267859" y="4028661"/>
+            <a:ext cx="1620000" cy="0"/>
+          </a:xfrm>
+          <a:prstGeom prst="line">
+            <a:avLst/>
+          </a:prstGeom>
+          <a:ln>
+            <a:headEnd type="oval" w="med" len="med"/>
+            <a:tailEnd type="oval" w="med" len="med"/>
+          </a:ln>
+        </p:spPr>
+        <p:style>
+          <a:lnRef idx="2">
+            <a:schemeClr val="accent6"/>
+          </a:lnRef>
+          <a:fillRef idx="0">
+            <a:schemeClr val="accent6"/>
+          </a:fillRef>
+          <a:effectRef idx="1">
+            <a:schemeClr val="accent6"/>
+          </a:effectRef>
+          <a:fontRef idx="minor">
+            <a:schemeClr val="tx1"/>
+          </a:fontRef>
+        </p:style>
+      </p:cxnSp>
+      <p:cxnSp>
+        <p:nvCxnSpPr>
+          <p:cNvPr id="49" name="Straight Arrow Connector 48">
+            <a:extLst>
+              <a:ext uri="{FF2B5EF4-FFF2-40B4-BE49-F238E27FC236}">
+                <a16:creationId xmlns:a16="http://schemas.microsoft.com/office/drawing/2014/main" id="{62B30667-4DE3-0DFC-9131-E9D581A8FC8B}"/>
               </a:ext>
             </a:extLst>
           </p:cNvPr>
@@ -16069,7 +15300,7 @@
         </p:nvCxnSpPr>
         <p:spPr>
           <a:xfrm flipH="1">
-            <a:off x="9168546" y="782954"/>
+            <a:off x="9887858" y="2975268"/>
             <a:ext cx="0" cy="900000"/>
           </a:xfrm>
           <a:prstGeom prst="straightConnector1">
@@ -16096,51 +15327,10 @@
       </p:cxnSp>
       <p:cxnSp>
         <p:nvCxnSpPr>
-          <p:cNvPr id="87" name="Straight Connector 86">
-            <a:extLst>
-              <a:ext uri="{FF2B5EF4-FFF2-40B4-BE49-F238E27FC236}">
-                <a16:creationId xmlns:a16="http://schemas.microsoft.com/office/drawing/2014/main" id="{F60D5509-3C71-4E91-8F5F-E9A079BF5F44}"/>
-              </a:ext>
-            </a:extLst>
-          </p:cNvPr>
-          <p:cNvCxnSpPr/>
-          <p:nvPr/>
-        </p:nvCxnSpPr>
-        <p:spPr>
-          <a:xfrm>
-            <a:off x="4020546" y="4994484"/>
-            <a:ext cx="3240000" cy="0"/>
-          </a:xfrm>
-          <a:prstGeom prst="line">
-            <a:avLst/>
-          </a:prstGeom>
-          <a:ln cap="flat">
-            <a:prstDash val="solid"/>
-            <a:headEnd type="oval" w="med" len="med"/>
-            <a:tailEnd type="oval" w="med" len="med"/>
-          </a:ln>
-        </p:spPr>
-        <p:style>
-          <a:lnRef idx="2">
-            <a:schemeClr val="accent1"/>
-          </a:lnRef>
-          <a:fillRef idx="0">
-            <a:schemeClr val="accent1"/>
-          </a:fillRef>
-          <a:effectRef idx="1">
-            <a:schemeClr val="accent1"/>
-          </a:effectRef>
-          <a:fontRef idx="minor">
-            <a:schemeClr val="tx1"/>
-          </a:fontRef>
-        </p:style>
-      </p:cxnSp>
-      <p:cxnSp>
-        <p:nvCxnSpPr>
-          <p:cNvPr id="88" name="Straight Arrow Connector 87">
-            <a:extLst>
-              <a:ext uri="{FF2B5EF4-FFF2-40B4-BE49-F238E27FC236}">
-                <a16:creationId xmlns:a16="http://schemas.microsoft.com/office/drawing/2014/main" id="{F900F894-DCCE-A709-B272-E81B79292B4D}"/>
+          <p:cNvPr id="3" name="Straight Connector 2">
+            <a:extLst>
+              <a:ext uri="{FF2B5EF4-FFF2-40B4-BE49-F238E27FC236}">
+                <a16:creationId xmlns:a16="http://schemas.microsoft.com/office/drawing/2014/main" id="{A65BD5A2-C3DC-6C7C-9EF3-9A78EA81CFD1}"/>
               </a:ext>
             </a:extLst>
           </p:cNvPr>
@@ -16151,108 +15341,70 @@
         </p:nvCxnSpPr>
         <p:spPr>
           <a:xfrm>
-            <a:off x="4020546" y="5147878"/>
-            <a:ext cx="0" cy="900000"/>
-          </a:xfrm>
-          <a:prstGeom prst="straightConnector1">
-            <a:avLst/>
-          </a:prstGeom>
-          <a:ln>
-            <a:tailEnd type="triangle"/>
-          </a:ln>
-        </p:spPr>
-        <p:style>
-          <a:lnRef idx="2">
-            <a:schemeClr val="accent2"/>
-          </a:lnRef>
-          <a:fillRef idx="0">
-            <a:schemeClr val="accent2"/>
-          </a:fillRef>
-          <a:effectRef idx="1">
-            <a:schemeClr val="accent2"/>
-          </a:effectRef>
-          <a:fontRef idx="minor">
-            <a:schemeClr val="tx1"/>
-          </a:fontRef>
-        </p:style>
-      </p:cxnSp>
-      <p:sp>
-        <p:nvSpPr>
-          <p:cNvPr id="89" name="TextBox 88">
-            <a:extLst>
-              <a:ext uri="{FF2B5EF4-FFF2-40B4-BE49-F238E27FC236}">
-                <a16:creationId xmlns:a16="http://schemas.microsoft.com/office/drawing/2014/main" id="{AA90B54D-1AA3-EA55-F5F5-53495E7931F6}"/>
-              </a:ext>
-            </a:extLst>
-          </p:cNvPr>
-          <p:cNvSpPr txBox="1"/>
-          <p:nvPr/>
-        </p:nvSpPr>
-        <p:spPr>
-          <a:xfrm>
-            <a:off x="3745470" y="4471759"/>
-            <a:ext cx="550151" cy="369332"/>
-          </a:xfrm>
-          <a:prstGeom prst="rect">
-            <a:avLst/>
-          </a:prstGeom>
-          <a:noFill/>
-        </p:spPr>
-        <p:txBody>
-          <a:bodyPr wrap="none" rtlCol="0">
-            <a:spAutoFit/>
-          </a:bodyPr>
-          <a:lstStyle/>
-          <a:p>
-            <a:r>
-              <a:rPr lang="en-GB" dirty="0"/>
-              <a:t>asp</a:t>
-            </a:r>
-          </a:p>
-        </p:txBody>
-      </p:sp>
-      <p:sp>
-        <p:nvSpPr>
-          <p:cNvPr id="90" name="TextBox 89">
-            <a:extLst>
-              <a:ext uri="{FF2B5EF4-FFF2-40B4-BE49-F238E27FC236}">
-                <a16:creationId xmlns:a16="http://schemas.microsoft.com/office/drawing/2014/main" id="{EC9F0B43-8152-40EE-A639-03DC21E61AB8}"/>
-              </a:ext>
-            </a:extLst>
-          </p:cNvPr>
-          <p:cNvSpPr txBox="1"/>
-          <p:nvPr/>
-        </p:nvSpPr>
-        <p:spPr>
-          <a:xfrm>
-            <a:off x="6990546" y="4471759"/>
-            <a:ext cx="556563" cy="369332"/>
-          </a:xfrm>
-          <a:prstGeom prst="rect">
-            <a:avLst/>
-          </a:prstGeom>
-          <a:noFill/>
-        </p:spPr>
-        <p:txBody>
-          <a:bodyPr wrap="none" rtlCol="0">
-            <a:spAutoFit/>
-          </a:bodyPr>
-          <a:lstStyle/>
-          <a:p>
-            <a:r>
-              <a:rPr lang="en-GB" dirty="0" err="1"/>
-              <a:t>dsp</a:t>
-            </a:r>
-            <a:endParaRPr lang="en-GB" dirty="0"/>
-          </a:p>
-        </p:txBody>
-      </p:sp>
-      <p:cxnSp>
-        <p:nvCxnSpPr>
-          <p:cNvPr id="91" name="Straight Arrow Connector 90">
-            <a:extLst>
-              <a:ext uri="{FF2B5EF4-FFF2-40B4-BE49-F238E27FC236}">
-                <a16:creationId xmlns:a16="http://schemas.microsoft.com/office/drawing/2014/main" id="{68133CAC-944A-D4C5-E872-6235543C330F}"/>
+            <a:off x="9779859" y="4028661"/>
+            <a:ext cx="108000" cy="0"/>
+          </a:xfrm>
+          <a:prstGeom prst="line">
+            <a:avLst/>
+          </a:prstGeom>
+        </p:spPr>
+        <p:style>
+          <a:lnRef idx="2">
+            <a:schemeClr val="accent1"/>
+          </a:lnRef>
+          <a:fillRef idx="0">
+            <a:schemeClr val="accent1"/>
+          </a:fillRef>
+          <a:effectRef idx="1">
+            <a:schemeClr val="accent1"/>
+          </a:effectRef>
+          <a:fontRef idx="minor">
+            <a:schemeClr val="tx1"/>
+          </a:fontRef>
+        </p:style>
+      </p:cxnSp>
+      <p:cxnSp>
+        <p:nvCxnSpPr>
+          <p:cNvPr id="16" name="Straight Connector 15">
+            <a:extLst>
+              <a:ext uri="{FF2B5EF4-FFF2-40B4-BE49-F238E27FC236}">
+                <a16:creationId xmlns:a16="http://schemas.microsoft.com/office/drawing/2014/main" id="{E38F7135-F2C9-F8FD-0928-AA25C3A891B4}"/>
+              </a:ext>
+            </a:extLst>
+          </p:cNvPr>
+          <p:cNvCxnSpPr/>
+          <p:nvPr/>
+        </p:nvCxnSpPr>
+        <p:spPr>
+          <a:xfrm>
+            <a:off x="9779859" y="3960795"/>
+            <a:ext cx="0" cy="135732"/>
+          </a:xfrm>
+          <a:prstGeom prst="line">
+            <a:avLst/>
+          </a:prstGeom>
+        </p:spPr>
+        <p:style>
+          <a:lnRef idx="2">
+            <a:schemeClr val="accent1"/>
+          </a:lnRef>
+          <a:fillRef idx="0">
+            <a:schemeClr val="accent1"/>
+          </a:fillRef>
+          <a:effectRef idx="1">
+            <a:schemeClr val="accent1"/>
+          </a:effectRef>
+          <a:fontRef idx="minor">
+            <a:schemeClr val="tx1"/>
+          </a:fontRef>
+        </p:style>
+      </p:cxnSp>
+      <p:cxnSp>
+        <p:nvCxnSpPr>
+          <p:cNvPr id="18" name="Straight Connector 17">
+            <a:extLst>
+              <a:ext uri="{FF2B5EF4-FFF2-40B4-BE49-F238E27FC236}">
+                <a16:creationId xmlns:a16="http://schemas.microsoft.com/office/drawing/2014/main" id="{5932DA86-14D4-F953-5299-34F145A0A168}"/>
               </a:ext>
             </a:extLst>
           </p:cNvPr>
@@ -16262,67 +15414,361 @@
           <p:nvPr/>
         </p:nvCxnSpPr>
         <p:spPr>
-          <a:xfrm flipH="1">
-            <a:off x="7260546" y="5147878"/>
-            <a:ext cx="0" cy="900000"/>
-          </a:xfrm>
-          <a:prstGeom prst="straightConnector1">
-            <a:avLst/>
-          </a:prstGeom>
-          <a:ln>
-            <a:tailEnd type="triangle"/>
-          </a:ln>
-        </p:spPr>
-        <p:style>
-          <a:lnRef idx="2">
-            <a:schemeClr val="accent2"/>
-          </a:lnRef>
-          <a:fillRef idx="0">
-            <a:schemeClr val="accent2"/>
-          </a:fillRef>
-          <a:effectRef idx="1">
-            <a:schemeClr val="accent2"/>
-          </a:effectRef>
-          <a:fontRef idx="minor">
-            <a:schemeClr val="tx1"/>
-          </a:fontRef>
-        </p:style>
-      </p:cxnSp>
-      <p:sp>
-        <p:nvSpPr>
-          <p:cNvPr id="92" name="TextBox 91">
-            <a:extLst>
-              <a:ext uri="{FF2B5EF4-FFF2-40B4-BE49-F238E27FC236}">
-                <a16:creationId xmlns:a16="http://schemas.microsoft.com/office/drawing/2014/main" id="{F3F8B3DE-E942-2610-AFE5-327C473FB3A7}"/>
-              </a:ext>
-            </a:extLst>
-          </p:cNvPr>
-          <p:cNvSpPr txBox="1"/>
-          <p:nvPr/>
-        </p:nvSpPr>
-        <p:spPr>
-          <a:xfrm>
-            <a:off x="545602" y="980991"/>
-            <a:ext cx="497252" cy="369332"/>
-          </a:xfrm>
-          <a:prstGeom prst="rect">
-            <a:avLst/>
-          </a:prstGeom>
-          <a:noFill/>
-        </p:spPr>
-        <p:txBody>
-          <a:bodyPr wrap="none" rtlCol="0">
-            <a:spAutoFit/>
-          </a:bodyPr>
-          <a:lstStyle/>
-          <a:p>
-            <a:r>
-              <a:rPr lang="en-GB" dirty="0"/>
-              <a:t>4.0</a:t>
-            </a:r>
-          </a:p>
-        </p:txBody>
-      </p:sp>
+          <a:xfrm>
+            <a:off x="8159859" y="4028661"/>
+            <a:ext cx="108000" cy="0"/>
+          </a:xfrm>
+          <a:prstGeom prst="line">
+            <a:avLst/>
+          </a:prstGeom>
+        </p:spPr>
+        <p:style>
+          <a:lnRef idx="2">
+            <a:schemeClr val="accent1"/>
+          </a:lnRef>
+          <a:fillRef idx="0">
+            <a:schemeClr val="accent1"/>
+          </a:fillRef>
+          <a:effectRef idx="1">
+            <a:schemeClr val="accent1"/>
+          </a:effectRef>
+          <a:fontRef idx="minor">
+            <a:schemeClr val="tx1"/>
+          </a:fontRef>
+        </p:style>
+      </p:cxnSp>
+      <p:cxnSp>
+        <p:nvCxnSpPr>
+          <p:cNvPr id="19" name="Straight Connector 18">
+            <a:extLst>
+              <a:ext uri="{FF2B5EF4-FFF2-40B4-BE49-F238E27FC236}">
+                <a16:creationId xmlns:a16="http://schemas.microsoft.com/office/drawing/2014/main" id="{ED80366A-0750-E1ED-A5FD-C9D2B5A0DC8E}"/>
+              </a:ext>
+            </a:extLst>
+          </p:cNvPr>
+          <p:cNvCxnSpPr/>
+          <p:nvPr/>
+        </p:nvCxnSpPr>
+        <p:spPr>
+          <a:xfrm>
+            <a:off x="8159859" y="3960795"/>
+            <a:ext cx="0" cy="135732"/>
+          </a:xfrm>
+          <a:prstGeom prst="line">
+            <a:avLst/>
+          </a:prstGeom>
+        </p:spPr>
+        <p:style>
+          <a:lnRef idx="2">
+            <a:schemeClr val="accent1"/>
+          </a:lnRef>
+          <a:fillRef idx="0">
+            <a:schemeClr val="accent1"/>
+          </a:fillRef>
+          <a:effectRef idx="1">
+            <a:schemeClr val="accent1"/>
+          </a:effectRef>
+          <a:fontRef idx="minor">
+            <a:schemeClr val="tx1"/>
+          </a:fontRef>
+        </p:style>
+      </p:cxnSp>
+      <p:cxnSp>
+        <p:nvCxnSpPr>
+          <p:cNvPr id="20" name="Straight Connector 19">
+            <a:extLst>
+              <a:ext uri="{FF2B5EF4-FFF2-40B4-BE49-F238E27FC236}">
+                <a16:creationId xmlns:a16="http://schemas.microsoft.com/office/drawing/2014/main" id="{5EFBC4C8-0E14-AC2C-FC73-C4092418B823}"/>
+              </a:ext>
+            </a:extLst>
+          </p:cNvPr>
+          <p:cNvCxnSpPr>
+            <a:cxnSpLocks/>
+          </p:cNvCxnSpPr>
+          <p:nvPr/>
+        </p:nvCxnSpPr>
+        <p:spPr>
+          <a:xfrm>
+            <a:off x="6539858" y="4028661"/>
+            <a:ext cx="108000" cy="0"/>
+          </a:xfrm>
+          <a:prstGeom prst="line">
+            <a:avLst/>
+          </a:prstGeom>
+        </p:spPr>
+        <p:style>
+          <a:lnRef idx="2">
+            <a:schemeClr val="accent1"/>
+          </a:lnRef>
+          <a:fillRef idx="0">
+            <a:schemeClr val="accent1"/>
+          </a:fillRef>
+          <a:effectRef idx="1">
+            <a:schemeClr val="accent1"/>
+          </a:effectRef>
+          <a:fontRef idx="minor">
+            <a:schemeClr val="tx1"/>
+          </a:fontRef>
+        </p:style>
+      </p:cxnSp>
+      <p:cxnSp>
+        <p:nvCxnSpPr>
+          <p:cNvPr id="21" name="Straight Connector 20">
+            <a:extLst>
+              <a:ext uri="{FF2B5EF4-FFF2-40B4-BE49-F238E27FC236}">
+                <a16:creationId xmlns:a16="http://schemas.microsoft.com/office/drawing/2014/main" id="{C61433D7-FF83-0ECD-9B5B-F8252D5DFA81}"/>
+              </a:ext>
+            </a:extLst>
+          </p:cNvPr>
+          <p:cNvCxnSpPr/>
+          <p:nvPr/>
+        </p:nvCxnSpPr>
+        <p:spPr>
+          <a:xfrm>
+            <a:off x="6539858" y="3960795"/>
+            <a:ext cx="0" cy="135732"/>
+          </a:xfrm>
+          <a:prstGeom prst="line">
+            <a:avLst/>
+          </a:prstGeom>
+        </p:spPr>
+        <p:style>
+          <a:lnRef idx="2">
+            <a:schemeClr val="accent1"/>
+          </a:lnRef>
+          <a:fillRef idx="0">
+            <a:schemeClr val="accent1"/>
+          </a:fillRef>
+          <a:effectRef idx="1">
+            <a:schemeClr val="accent1"/>
+          </a:effectRef>
+          <a:fontRef idx="minor">
+            <a:schemeClr val="tx1"/>
+          </a:fontRef>
+        </p:style>
+      </p:cxnSp>
+      <p:cxnSp>
+        <p:nvCxnSpPr>
+          <p:cNvPr id="22" name="Straight Connector 21">
+            <a:extLst>
+              <a:ext uri="{FF2B5EF4-FFF2-40B4-BE49-F238E27FC236}">
+                <a16:creationId xmlns:a16="http://schemas.microsoft.com/office/drawing/2014/main" id="{178D3448-0963-D6FD-ACCB-0F250326BEF7}"/>
+              </a:ext>
+            </a:extLst>
+          </p:cNvPr>
+          <p:cNvCxnSpPr>
+            <a:cxnSpLocks/>
+          </p:cNvCxnSpPr>
+          <p:nvPr/>
+        </p:nvCxnSpPr>
+        <p:spPr>
+          <a:xfrm>
+            <a:off x="4920546" y="4028661"/>
+            <a:ext cx="108000" cy="0"/>
+          </a:xfrm>
+          <a:prstGeom prst="line">
+            <a:avLst/>
+          </a:prstGeom>
+        </p:spPr>
+        <p:style>
+          <a:lnRef idx="2">
+            <a:schemeClr val="accent1"/>
+          </a:lnRef>
+          <a:fillRef idx="0">
+            <a:schemeClr val="accent1"/>
+          </a:fillRef>
+          <a:effectRef idx="1">
+            <a:schemeClr val="accent1"/>
+          </a:effectRef>
+          <a:fontRef idx="minor">
+            <a:schemeClr val="tx1"/>
+          </a:fontRef>
+        </p:style>
+      </p:cxnSp>
+      <p:cxnSp>
+        <p:nvCxnSpPr>
+          <p:cNvPr id="23" name="Straight Connector 22">
+            <a:extLst>
+              <a:ext uri="{FF2B5EF4-FFF2-40B4-BE49-F238E27FC236}">
+                <a16:creationId xmlns:a16="http://schemas.microsoft.com/office/drawing/2014/main" id="{9A0584E6-5971-A1F2-1967-5E4A9692F612}"/>
+              </a:ext>
+            </a:extLst>
+          </p:cNvPr>
+          <p:cNvCxnSpPr/>
+          <p:nvPr/>
+        </p:nvCxnSpPr>
+        <p:spPr>
+          <a:xfrm>
+            <a:off x="4920546" y="3960795"/>
+            <a:ext cx="0" cy="135732"/>
+          </a:xfrm>
+          <a:prstGeom prst="line">
+            <a:avLst/>
+          </a:prstGeom>
+        </p:spPr>
+        <p:style>
+          <a:lnRef idx="2">
+            <a:schemeClr val="accent1"/>
+          </a:lnRef>
+          <a:fillRef idx="0">
+            <a:schemeClr val="accent1"/>
+          </a:fillRef>
+          <a:effectRef idx="1">
+            <a:schemeClr val="accent1"/>
+          </a:effectRef>
+          <a:fontRef idx="minor">
+            <a:schemeClr val="tx1"/>
+          </a:fontRef>
+        </p:style>
+      </p:cxnSp>
+      <p:cxnSp>
+        <p:nvCxnSpPr>
+          <p:cNvPr id="24" name="Straight Connector 23">
+            <a:extLst>
+              <a:ext uri="{FF2B5EF4-FFF2-40B4-BE49-F238E27FC236}">
+                <a16:creationId xmlns:a16="http://schemas.microsoft.com/office/drawing/2014/main" id="{AD3D9CF9-32C5-E4E6-F833-33EC4EB83E9E}"/>
+              </a:ext>
+            </a:extLst>
+          </p:cNvPr>
+          <p:cNvCxnSpPr>
+            <a:cxnSpLocks/>
+          </p:cNvCxnSpPr>
+          <p:nvPr/>
+        </p:nvCxnSpPr>
+        <p:spPr>
+          <a:xfrm>
+            <a:off x="3300546" y="4028661"/>
+            <a:ext cx="108000" cy="0"/>
+          </a:xfrm>
+          <a:prstGeom prst="line">
+            <a:avLst/>
+          </a:prstGeom>
+        </p:spPr>
+        <p:style>
+          <a:lnRef idx="2">
+            <a:schemeClr val="accent1"/>
+          </a:lnRef>
+          <a:fillRef idx="0">
+            <a:schemeClr val="accent1"/>
+          </a:fillRef>
+          <a:effectRef idx="1">
+            <a:schemeClr val="accent1"/>
+          </a:effectRef>
+          <a:fontRef idx="minor">
+            <a:schemeClr val="tx1"/>
+          </a:fontRef>
+        </p:style>
+      </p:cxnSp>
+      <p:cxnSp>
+        <p:nvCxnSpPr>
+          <p:cNvPr id="25" name="Straight Connector 24">
+            <a:extLst>
+              <a:ext uri="{FF2B5EF4-FFF2-40B4-BE49-F238E27FC236}">
+                <a16:creationId xmlns:a16="http://schemas.microsoft.com/office/drawing/2014/main" id="{736A730C-434D-8803-9E96-9846A31B11D0}"/>
+              </a:ext>
+            </a:extLst>
+          </p:cNvPr>
+          <p:cNvCxnSpPr/>
+          <p:nvPr/>
+        </p:nvCxnSpPr>
+        <p:spPr>
+          <a:xfrm>
+            <a:off x="3300546" y="3960795"/>
+            <a:ext cx="0" cy="135732"/>
+          </a:xfrm>
+          <a:prstGeom prst="line">
+            <a:avLst/>
+          </a:prstGeom>
+        </p:spPr>
+        <p:style>
+          <a:lnRef idx="2">
+            <a:schemeClr val="accent1"/>
+          </a:lnRef>
+          <a:fillRef idx="0">
+            <a:schemeClr val="accent1"/>
+          </a:fillRef>
+          <a:effectRef idx="1">
+            <a:schemeClr val="accent1"/>
+          </a:effectRef>
+          <a:fontRef idx="minor">
+            <a:schemeClr val="tx1"/>
+          </a:fontRef>
+        </p:style>
+      </p:cxnSp>
+      <p:cxnSp>
+        <p:nvCxnSpPr>
+          <p:cNvPr id="26" name="Straight Connector 25">
+            <a:extLst>
+              <a:ext uri="{FF2B5EF4-FFF2-40B4-BE49-F238E27FC236}">
+                <a16:creationId xmlns:a16="http://schemas.microsoft.com/office/drawing/2014/main" id="{400B5937-A4FA-C6C2-F665-1DC1E2C73014}"/>
+              </a:ext>
+            </a:extLst>
+          </p:cNvPr>
+          <p:cNvCxnSpPr>
+            <a:cxnSpLocks/>
+          </p:cNvCxnSpPr>
+          <p:nvPr/>
+        </p:nvCxnSpPr>
+        <p:spPr>
+          <a:xfrm>
+            <a:off x="1680545" y="4028661"/>
+            <a:ext cx="108000" cy="0"/>
+          </a:xfrm>
+          <a:prstGeom prst="line">
+            <a:avLst/>
+          </a:prstGeom>
+        </p:spPr>
+        <p:style>
+          <a:lnRef idx="2">
+            <a:schemeClr val="accent1"/>
+          </a:lnRef>
+          <a:fillRef idx="0">
+            <a:schemeClr val="accent1"/>
+          </a:fillRef>
+          <a:effectRef idx="1">
+            <a:schemeClr val="accent1"/>
+          </a:effectRef>
+          <a:fontRef idx="minor">
+            <a:schemeClr val="tx1"/>
+          </a:fontRef>
+        </p:style>
+      </p:cxnSp>
+      <p:cxnSp>
+        <p:nvCxnSpPr>
+          <p:cNvPr id="27" name="Straight Connector 26">
+            <a:extLst>
+              <a:ext uri="{FF2B5EF4-FFF2-40B4-BE49-F238E27FC236}">
+                <a16:creationId xmlns:a16="http://schemas.microsoft.com/office/drawing/2014/main" id="{5F74E0C3-E7D1-0BF3-D1D0-B1A70B0232C3}"/>
+              </a:ext>
+            </a:extLst>
+          </p:cNvPr>
+          <p:cNvCxnSpPr/>
+          <p:nvPr/>
+        </p:nvCxnSpPr>
+        <p:spPr>
+          <a:xfrm>
+            <a:off x="1680545" y="3960795"/>
+            <a:ext cx="0" cy="135732"/>
+          </a:xfrm>
+          <a:prstGeom prst="line">
+            <a:avLst/>
+          </a:prstGeom>
+        </p:spPr>
+        <p:style>
+          <a:lnRef idx="2">
+            <a:schemeClr val="accent1"/>
+          </a:lnRef>
+          <a:fillRef idx="0">
+            <a:schemeClr val="accent1"/>
+          </a:fillRef>
+          <a:effectRef idx="1">
+            <a:schemeClr val="accent1"/>
+          </a:effectRef>
+          <a:fontRef idx="minor">
+            <a:schemeClr val="tx1"/>
+          </a:fontRef>
+        </p:style>
+      </p:cxnSp>
       <p:sp>
         <p:nvSpPr>
           <p:cNvPr id="93" name="TextBox 92">
@@ -16337,7 +15783,7 @@
         </p:nvSpPr>
         <p:spPr>
           <a:xfrm>
-            <a:off x="507270" y="4292713"/>
+            <a:off x="545602" y="3270402"/>
             <a:ext cx="497252" cy="369332"/>
           </a:xfrm>
           <a:prstGeom prst="rect">
@@ -16360,10 +15806,10 @@
       </p:sp>
       <p:sp>
         <p:nvSpPr>
-          <p:cNvPr id="94" name="TextBox 93">
-            <a:extLst>
-              <a:ext uri="{FF2B5EF4-FFF2-40B4-BE49-F238E27FC236}">
-                <a16:creationId xmlns:a16="http://schemas.microsoft.com/office/drawing/2014/main" id="{5C6F2DE9-2E19-3F74-739B-3E51CCF15F3E}"/>
+          <p:cNvPr id="102" name="TextBox 101">
+            <a:extLst>
+              <a:ext uri="{FF2B5EF4-FFF2-40B4-BE49-F238E27FC236}">
+                <a16:creationId xmlns:a16="http://schemas.microsoft.com/office/drawing/2014/main" id="{54472C58-05E0-7EAD-1AA1-3CBB53C7234C}"/>
               </a:ext>
             </a:extLst>
           </p:cNvPr>
@@ -16372,42 +15818,7 @@
         </p:nvSpPr>
         <p:spPr>
           <a:xfrm>
-            <a:off x="545602" y="5559813"/>
-            <a:ext cx="497252" cy="369332"/>
-          </a:xfrm>
-          <a:prstGeom prst="rect">
-            <a:avLst/>
-          </a:prstGeom>
-          <a:noFill/>
-        </p:spPr>
-        <p:txBody>
-          <a:bodyPr wrap="none" rtlCol="0">
-            <a:spAutoFit/>
-          </a:bodyPr>
-          <a:lstStyle/>
-          <a:p>
-            <a:r>
-              <a:rPr lang="en-GB" dirty="0"/>
-              <a:t>5.5</a:t>
-            </a:r>
-          </a:p>
-        </p:txBody>
-      </p:sp>
-      <p:sp>
-        <p:nvSpPr>
-          <p:cNvPr id="95" name="TextBox 94">
-            <a:extLst>
-              <a:ext uri="{FF2B5EF4-FFF2-40B4-BE49-F238E27FC236}">
-                <a16:creationId xmlns:a16="http://schemas.microsoft.com/office/drawing/2014/main" id="{7011210D-64A9-921D-BA76-05FC798516E4}"/>
-              </a:ext>
-            </a:extLst>
-          </p:cNvPr>
-          <p:cNvSpPr txBox="1"/>
-          <p:nvPr/>
-        </p:nvSpPr>
-        <p:spPr>
-          <a:xfrm>
-            <a:off x="9700260" y="980991"/>
+            <a:off x="10728960" y="3270402"/>
             <a:ext cx="556563" cy="369332"/>
           </a:xfrm>
           <a:prstGeom prst="rect">
@@ -16429,47 +15840,12 @@
           </a:p>
         </p:txBody>
       </p:sp>
-      <p:sp>
-        <p:nvSpPr>
-          <p:cNvPr id="96" name="TextBox 95">
-            <a:extLst>
-              <a:ext uri="{FF2B5EF4-FFF2-40B4-BE49-F238E27FC236}">
-                <a16:creationId xmlns:a16="http://schemas.microsoft.com/office/drawing/2014/main" id="{5B990ACC-9933-98B9-803E-0D2AE74A4576}"/>
-              </a:ext>
-            </a:extLst>
-          </p:cNvPr>
-          <p:cNvSpPr txBox="1"/>
-          <p:nvPr/>
-        </p:nvSpPr>
-        <p:spPr>
-          <a:xfrm>
-            <a:off x="9055400" y="5293911"/>
-            <a:ext cx="550151" cy="369332"/>
-          </a:xfrm>
-          <a:prstGeom prst="rect">
-            <a:avLst/>
-          </a:prstGeom>
-          <a:noFill/>
-        </p:spPr>
-        <p:txBody>
-          <a:bodyPr wrap="none" rtlCol="0">
-            <a:spAutoFit/>
-          </a:bodyPr>
-          <a:lstStyle/>
-          <a:p>
-            <a:r>
-              <a:rPr lang="en-GB" dirty="0"/>
-              <a:t>asp</a:t>
-            </a:r>
-          </a:p>
-        </p:txBody>
-      </p:sp>
-      <p:cxnSp>
-        <p:nvCxnSpPr>
-          <p:cNvPr id="98" name="Straight Connector 97">
-            <a:extLst>
-              <a:ext uri="{FF2B5EF4-FFF2-40B4-BE49-F238E27FC236}">
-                <a16:creationId xmlns:a16="http://schemas.microsoft.com/office/drawing/2014/main" id="{CF03C3A2-5F12-361A-0202-4923CC5AEF56}"/>
+      <p:cxnSp>
+        <p:nvCxnSpPr>
+          <p:cNvPr id="105" name="Straight Connector 104">
+            <a:extLst>
+              <a:ext uri="{FF2B5EF4-FFF2-40B4-BE49-F238E27FC236}">
+                <a16:creationId xmlns:a16="http://schemas.microsoft.com/office/drawing/2014/main" id="{A714533D-DFC8-692A-D9BF-15CA47CCA0A5}"/>
               </a:ext>
             </a:extLst>
           </p:cNvPr>
@@ -16480,70 +15856,34 @@
         </p:nvCxnSpPr>
         <p:spPr>
           <a:xfrm>
-            <a:off x="7260546" y="6093122"/>
-            <a:ext cx="828000" cy="0"/>
-          </a:xfrm>
-          <a:prstGeom prst="line">
-            <a:avLst/>
-          </a:prstGeom>
-        </p:spPr>
-        <p:style>
-          <a:lnRef idx="2">
-            <a:schemeClr val="accent1"/>
-          </a:lnRef>
-          <a:fillRef idx="0">
-            <a:schemeClr val="accent1"/>
-          </a:fillRef>
-          <a:effectRef idx="1">
-            <a:schemeClr val="accent1"/>
-          </a:effectRef>
-          <a:fontRef idx="minor">
-            <a:schemeClr val="tx1"/>
-          </a:fontRef>
-        </p:style>
-      </p:cxnSp>
-      <p:sp>
-        <p:nvSpPr>
-          <p:cNvPr id="102" name="TextBox 101">
-            <a:extLst>
-              <a:ext uri="{FF2B5EF4-FFF2-40B4-BE49-F238E27FC236}">
-                <a16:creationId xmlns:a16="http://schemas.microsoft.com/office/drawing/2014/main" id="{54472C58-05E0-7EAD-1AA1-3CBB53C7234C}"/>
-              </a:ext>
-            </a:extLst>
-          </p:cNvPr>
-          <p:cNvSpPr txBox="1"/>
-          <p:nvPr/>
-        </p:nvSpPr>
-        <p:spPr>
-          <a:xfrm>
-            <a:off x="10697859" y="4360062"/>
-            <a:ext cx="556563" cy="369332"/>
-          </a:xfrm>
-          <a:prstGeom prst="rect">
-            <a:avLst/>
-          </a:prstGeom>
-          <a:noFill/>
-        </p:spPr>
-        <p:txBody>
-          <a:bodyPr wrap="none" rtlCol="0">
-            <a:spAutoFit/>
-          </a:bodyPr>
-          <a:lstStyle/>
-          <a:p>
-            <a:r>
-              <a:rPr lang="en-GB" dirty="0" err="1"/>
-              <a:t>dsp</a:t>
-            </a:r>
-            <a:endParaRPr lang="en-GB" dirty="0"/>
-          </a:p>
-        </p:txBody>
-      </p:sp>
-      <p:cxnSp>
-        <p:nvCxnSpPr>
-          <p:cNvPr id="2" name="Straight Connector 1">
-            <a:extLst>
-              <a:ext uri="{FF2B5EF4-FFF2-40B4-BE49-F238E27FC236}">
-                <a16:creationId xmlns:a16="http://schemas.microsoft.com/office/drawing/2014/main" id="{889E556C-1884-1604-6392-0C328A604638}"/>
+            <a:off x="9675084" y="4028661"/>
+            <a:ext cx="108000" cy="0"/>
+          </a:xfrm>
+          <a:prstGeom prst="line">
+            <a:avLst/>
+          </a:prstGeom>
+        </p:spPr>
+        <p:style>
+          <a:lnRef idx="2">
+            <a:schemeClr val="accent1"/>
+          </a:lnRef>
+          <a:fillRef idx="0">
+            <a:schemeClr val="accent1"/>
+          </a:fillRef>
+          <a:effectRef idx="1">
+            <a:schemeClr val="accent1"/>
+          </a:effectRef>
+          <a:fontRef idx="minor">
+            <a:schemeClr val="tx1"/>
+          </a:fontRef>
+        </p:style>
+      </p:cxnSp>
+      <p:cxnSp>
+        <p:nvCxnSpPr>
+          <p:cNvPr id="106" name="Straight Connector 105">
+            <a:extLst>
+              <a:ext uri="{FF2B5EF4-FFF2-40B4-BE49-F238E27FC236}">
+                <a16:creationId xmlns:a16="http://schemas.microsoft.com/office/drawing/2014/main" id="{F58E9797-A10C-A1E0-1A14-E605454FC6FB}"/>
               </a:ext>
             </a:extLst>
           </p:cNvPr>
@@ -16552,85 +15892,7 @@
         </p:nvCxnSpPr>
         <p:spPr>
           <a:xfrm>
-            <a:off x="9887859" y="4028661"/>
-            <a:ext cx="1620000" cy="0"/>
-          </a:xfrm>
-          <a:prstGeom prst="line">
-            <a:avLst/>
-          </a:prstGeom>
-          <a:ln>
-            <a:headEnd type="oval" w="med" len="med"/>
-            <a:tailEnd type="oval" w="med" len="med"/>
-          </a:ln>
-        </p:spPr>
-        <p:style>
-          <a:lnRef idx="2">
-            <a:schemeClr val="accent6"/>
-          </a:lnRef>
-          <a:fillRef idx="0">
-            <a:schemeClr val="accent6"/>
-          </a:fillRef>
-          <a:effectRef idx="1">
-            <a:schemeClr val="accent6"/>
-          </a:effectRef>
-          <a:fontRef idx="minor">
-            <a:schemeClr val="tx1"/>
-          </a:fontRef>
-        </p:style>
-      </p:cxnSp>
-      <p:cxnSp>
-        <p:nvCxnSpPr>
-          <p:cNvPr id="4" name="Straight Connector 3">
-            <a:extLst>
-              <a:ext uri="{FF2B5EF4-FFF2-40B4-BE49-F238E27FC236}">
-                <a16:creationId xmlns:a16="http://schemas.microsoft.com/office/drawing/2014/main" id="{A945A4D7-614D-F924-2460-9AF79CE0F0F1}"/>
-              </a:ext>
-            </a:extLst>
-          </p:cNvPr>
-          <p:cNvCxnSpPr>
-            <a:cxnSpLocks/>
-          </p:cNvCxnSpPr>
-          <p:nvPr/>
-        </p:nvCxnSpPr>
-        <p:spPr>
-          <a:xfrm>
-            <a:off x="11399859" y="4028661"/>
-            <a:ext cx="108000" cy="0"/>
-          </a:xfrm>
-          <a:prstGeom prst="line">
-            <a:avLst/>
-          </a:prstGeom>
-        </p:spPr>
-        <p:style>
-          <a:lnRef idx="2">
-            <a:schemeClr val="accent1"/>
-          </a:lnRef>
-          <a:fillRef idx="0">
-            <a:schemeClr val="accent1"/>
-          </a:fillRef>
-          <a:effectRef idx="1">
-            <a:schemeClr val="accent1"/>
-          </a:effectRef>
-          <a:fontRef idx="minor">
-            <a:schemeClr val="tx1"/>
-          </a:fontRef>
-        </p:style>
-      </p:cxnSp>
-      <p:cxnSp>
-        <p:nvCxnSpPr>
-          <p:cNvPr id="9" name="Straight Connector 8">
-            <a:extLst>
-              <a:ext uri="{FF2B5EF4-FFF2-40B4-BE49-F238E27FC236}">
-                <a16:creationId xmlns:a16="http://schemas.microsoft.com/office/drawing/2014/main" id="{25EF4A3B-2113-91AF-466D-225D505E2EDE}"/>
-              </a:ext>
-            </a:extLst>
-          </p:cNvPr>
-          <p:cNvCxnSpPr/>
-          <p:nvPr/>
-        </p:nvCxnSpPr>
-        <p:spPr>
-          <a:xfrm>
-            <a:off x="11399859" y="3960795"/>
+            <a:off x="9675084" y="3960795"/>
             <a:ext cx="0" cy="135732"/>
           </a:xfrm>
           <a:prstGeom prst="line">
@@ -16655,7 +15917,7 @@
     </p:spTree>
     <p:extLst>
       <p:ext uri="{BB962C8B-B14F-4D97-AF65-F5344CB8AC3E}">
-        <p14:creationId xmlns:p14="http://schemas.microsoft.com/office/powerpoint/2010/main" val="731477823"/>
+        <p14:creationId xmlns:p14="http://schemas.microsoft.com/office/powerpoint/2010/main" val="1988459515"/>
       </p:ext>
     </p:extLst>
   </p:cSld>

</xml_diff>